<commit_message>
merge diapos clase 1
</commit_message>
<xml_diff>
--- a/S01_Intro/01_ProblemasIntroductorios/Diapos.pptx
+++ b/S01_Intro/01_ProblemasIntroductorios/Diapos.pptx
@@ -5,37 +5,46 @@
     <p:sldMasterId id="2147483648" r:id="rId1"/>
   </p:sldMasterIdLst>
   <p:sldIdLst>
-    <p:sldId id="256" r:id="rId2"/>
-    <p:sldId id="276" r:id="rId3"/>
-    <p:sldId id="268" r:id="rId4"/>
-    <p:sldId id="269" r:id="rId5"/>
-    <p:sldId id="270" r:id="rId6"/>
-    <p:sldId id="271" r:id="rId7"/>
-    <p:sldId id="272" r:id="rId8"/>
-    <p:sldId id="273" r:id="rId9"/>
-    <p:sldId id="277" r:id="rId10"/>
-    <p:sldId id="275" r:id="rId11"/>
-    <p:sldId id="278" r:id="rId12"/>
-    <p:sldId id="279" r:id="rId13"/>
-    <p:sldId id="280" r:id="rId14"/>
-    <p:sldId id="281" r:id="rId15"/>
-    <p:sldId id="282" r:id="rId16"/>
-    <p:sldId id="285" r:id="rId17"/>
-    <p:sldId id="283" r:id="rId18"/>
-    <p:sldId id="284" r:id="rId19"/>
-    <p:sldId id="274" r:id="rId20"/>
-    <p:sldId id="286" r:id="rId21"/>
-    <p:sldId id="267" r:id="rId22"/>
-    <p:sldId id="257" r:id="rId23"/>
-    <p:sldId id="260" r:id="rId24"/>
-    <p:sldId id="261" r:id="rId25"/>
-    <p:sldId id="262" r:id="rId26"/>
-    <p:sldId id="258" r:id="rId27"/>
-    <p:sldId id="259" r:id="rId28"/>
-    <p:sldId id="263" r:id="rId29"/>
-    <p:sldId id="264" r:id="rId30"/>
-    <p:sldId id="265" r:id="rId31"/>
-    <p:sldId id="266" r:id="rId32"/>
+    <p:sldId id="287" r:id="rId2"/>
+    <p:sldId id="288" r:id="rId3"/>
+    <p:sldId id="289" r:id="rId4"/>
+    <p:sldId id="290" r:id="rId5"/>
+    <p:sldId id="293" r:id="rId6"/>
+    <p:sldId id="292" r:id="rId7"/>
+    <p:sldId id="291" r:id="rId8"/>
+    <p:sldId id="294" r:id="rId9"/>
+    <p:sldId id="256" r:id="rId10"/>
+    <p:sldId id="276" r:id="rId11"/>
+    <p:sldId id="268" r:id="rId12"/>
+    <p:sldId id="269" r:id="rId13"/>
+    <p:sldId id="270" r:id="rId14"/>
+    <p:sldId id="271" r:id="rId15"/>
+    <p:sldId id="272" r:id="rId16"/>
+    <p:sldId id="273" r:id="rId17"/>
+    <p:sldId id="277" r:id="rId18"/>
+    <p:sldId id="275" r:id="rId19"/>
+    <p:sldId id="278" r:id="rId20"/>
+    <p:sldId id="279" r:id="rId21"/>
+    <p:sldId id="280" r:id="rId22"/>
+    <p:sldId id="281" r:id="rId23"/>
+    <p:sldId id="282" r:id="rId24"/>
+    <p:sldId id="285" r:id="rId25"/>
+    <p:sldId id="283" r:id="rId26"/>
+    <p:sldId id="284" r:id="rId27"/>
+    <p:sldId id="274" r:id="rId28"/>
+    <p:sldId id="286" r:id="rId29"/>
+    <p:sldId id="295" r:id="rId30"/>
+    <p:sldId id="267" r:id="rId31"/>
+    <p:sldId id="257" r:id="rId32"/>
+    <p:sldId id="260" r:id="rId33"/>
+    <p:sldId id="261" r:id="rId34"/>
+    <p:sldId id="262" r:id="rId35"/>
+    <p:sldId id="258" r:id="rId36"/>
+    <p:sldId id="259" r:id="rId37"/>
+    <p:sldId id="263" r:id="rId38"/>
+    <p:sldId id="264" r:id="rId39"/>
+    <p:sldId id="265" r:id="rId40"/>
+    <p:sldId id="266" r:id="rId41"/>
   </p:sldIdLst>
   <p:sldSz cx="9144000" cy="6858000" type="screen4x3"/>
   <p:notesSz cx="6858000" cy="9144000"/>
@@ -332,7 +341,7 @@
           <a:p>
             <a:fld id="{5BCAD085-E8A6-8845-BD4E-CB4CCA059FC4}" type="datetimeFigureOut">
               <a:rPr lang="en-US" smtClean="0"/>
-              <a:t>2/25/2026</a:t>
+              <a:t>2/27/2026</a:t>
             </a:fld>
             <a:endParaRPr lang="en-US"/>
           </a:p>
@@ -500,7 +509,7 @@
           <a:p>
             <a:fld id="{5BCAD085-E8A6-8845-BD4E-CB4CCA059FC4}" type="datetimeFigureOut">
               <a:rPr lang="en-US" smtClean="0"/>
-              <a:t>2/25/2026</a:t>
+              <a:t>2/27/2026</a:t>
             </a:fld>
             <a:endParaRPr lang="en-US"/>
           </a:p>
@@ -678,7 +687,7 @@
           <a:p>
             <a:fld id="{5BCAD085-E8A6-8845-BD4E-CB4CCA059FC4}" type="datetimeFigureOut">
               <a:rPr lang="en-US" smtClean="0"/>
-              <a:t>2/25/2026</a:t>
+              <a:t>2/27/2026</a:t>
             </a:fld>
             <a:endParaRPr lang="en-US"/>
           </a:p>
@@ -846,7 +855,7 @@
           <a:p>
             <a:fld id="{5BCAD085-E8A6-8845-BD4E-CB4CCA059FC4}" type="datetimeFigureOut">
               <a:rPr lang="en-US" smtClean="0"/>
-              <a:t>2/25/2026</a:t>
+              <a:t>2/27/2026</a:t>
             </a:fld>
             <a:endParaRPr lang="en-US"/>
           </a:p>
@@ -1091,7 +1100,7 @@
           <a:p>
             <a:fld id="{5BCAD085-E8A6-8845-BD4E-CB4CCA059FC4}" type="datetimeFigureOut">
               <a:rPr lang="en-US" smtClean="0"/>
-              <a:t>2/25/2026</a:t>
+              <a:t>2/27/2026</a:t>
             </a:fld>
             <a:endParaRPr lang="en-US"/>
           </a:p>
@@ -1376,7 +1385,7 @@
           <a:p>
             <a:fld id="{5BCAD085-E8A6-8845-BD4E-CB4CCA059FC4}" type="datetimeFigureOut">
               <a:rPr lang="en-US" smtClean="0"/>
-              <a:t>2/25/2026</a:t>
+              <a:t>2/27/2026</a:t>
             </a:fld>
             <a:endParaRPr lang="en-US"/>
           </a:p>
@@ -1795,7 +1804,7 @@
           <a:p>
             <a:fld id="{5BCAD085-E8A6-8845-BD4E-CB4CCA059FC4}" type="datetimeFigureOut">
               <a:rPr lang="en-US" smtClean="0"/>
-              <a:t>2/25/2026</a:t>
+              <a:t>2/27/2026</a:t>
             </a:fld>
             <a:endParaRPr lang="en-US"/>
           </a:p>
@@ -1912,7 +1921,7 @@
           <a:p>
             <a:fld id="{5BCAD085-E8A6-8845-BD4E-CB4CCA059FC4}" type="datetimeFigureOut">
               <a:rPr lang="en-US" smtClean="0"/>
-              <a:t>2/25/2026</a:t>
+              <a:t>2/27/2026</a:t>
             </a:fld>
             <a:endParaRPr lang="en-US"/>
           </a:p>
@@ -2007,7 +2016,7 @@
           <a:p>
             <a:fld id="{5BCAD085-E8A6-8845-BD4E-CB4CCA059FC4}" type="datetimeFigureOut">
               <a:rPr lang="en-US" smtClean="0"/>
-              <a:t>2/25/2026</a:t>
+              <a:t>2/27/2026</a:t>
             </a:fld>
             <a:endParaRPr lang="en-US"/>
           </a:p>
@@ -2282,7 +2291,7 @@
           <a:p>
             <a:fld id="{5BCAD085-E8A6-8845-BD4E-CB4CCA059FC4}" type="datetimeFigureOut">
               <a:rPr lang="en-US" smtClean="0"/>
-              <a:t>2/25/2026</a:t>
+              <a:t>2/27/2026</a:t>
             </a:fld>
             <a:endParaRPr lang="en-US"/>
           </a:p>
@@ -2534,7 +2543,7 @@
           <a:p>
             <a:fld id="{5BCAD085-E8A6-8845-BD4E-CB4CCA059FC4}" type="datetimeFigureOut">
               <a:rPr lang="en-US" smtClean="0"/>
-              <a:t>2/25/2026</a:t>
+              <a:t>2/27/2026</a:t>
             </a:fld>
             <a:endParaRPr lang="en-US"/>
           </a:p>
@@ -2745,7 +2754,7 @@
           <a:p>
             <a:fld id="{5BCAD085-E8A6-8845-BD4E-CB4CCA059FC4}" type="datetimeFigureOut">
               <a:rPr lang="en-US" smtClean="0"/>
-              <a:t>2/25/2026</a:t>
+              <a:t>2/27/2026</a:t>
             </a:fld>
             <a:endParaRPr lang="en-US"/>
           </a:p>
@@ -3122,7 +3131,13 @@
       </p:grpSpPr>
       <p:sp>
         <p:nvSpPr>
-          <p:cNvPr id="2" name="Title 1"/>
+          <p:cNvPr id="2" name="Title 1">
+            <a:extLst>
+              <a:ext uri="{FF2B5EF4-FFF2-40B4-BE49-F238E27FC236}">
+                <a16:creationId xmlns:a16="http://schemas.microsoft.com/office/drawing/2014/main" id="{930D7EB4-E975-F523-9FCC-7048E497AE45}"/>
+              </a:ext>
+            </a:extLst>
+          </p:cNvPr>
           <p:cNvSpPr>
             <a:spLocks noGrp="1"/>
           </p:cNvSpPr>
@@ -3130,27 +3145,36 @@
             <p:ph type="ctrTitle"/>
           </p:nvPr>
         </p:nvSpPr>
-        <p:spPr>
-          <a:xfrm>
-            <a:off x="685800" y="1753054"/>
-            <a:ext cx="7772400" cy="1470025"/>
-          </a:xfrm>
-        </p:spPr>
+        <p:spPr/>
         <p:txBody>
           <a:bodyPr/>
           <a:lstStyle/>
           <a:p>
             <a:r>
+              <a:rPr lang="en-US" dirty="0" err="1"/>
+              <a:t>Teoría</a:t>
+            </a:r>
+            <a:r>
               <a:rPr lang="en-US" dirty="0"/>
-              <a:t>Halting Problem (HP)</a:t>
-            </a:r>
-            <a:endParaRPr dirty="0"/>
-          </a:p>
-        </p:txBody>
-      </p:sp>
-      <p:sp>
-        <p:nvSpPr>
-          <p:cNvPr id="3" name="Subtitle 2"/>
+              <a:t> de la </a:t>
+            </a:r>
+            <a:r>
+              <a:rPr lang="en-US" dirty="0" err="1"/>
+              <a:t>Computación</a:t>
+            </a:r>
+            <a:endParaRPr lang="en-US" dirty="0"/>
+          </a:p>
+        </p:txBody>
+      </p:sp>
+      <p:sp>
+        <p:nvSpPr>
+          <p:cNvPr id="3" name="Subtitle 2">
+            <a:extLst>
+              <a:ext uri="{FF2B5EF4-FFF2-40B4-BE49-F238E27FC236}">
+                <a16:creationId xmlns:a16="http://schemas.microsoft.com/office/drawing/2014/main" id="{67861597-5C39-454F-91AB-9601DAD64676}"/>
+              </a:ext>
+            </a:extLst>
+          </p:cNvPr>
           <p:cNvSpPr>
             <a:spLocks noGrp="1"/>
           </p:cNvSpPr>
@@ -3158,35 +3182,25 @@
             <p:ph type="subTitle" idx="1"/>
           </p:nvPr>
         </p:nvSpPr>
-        <p:spPr>
-          <a:xfrm>
-            <a:off x="1371600" y="3429001"/>
-            <a:ext cx="6400800" cy="2623456"/>
-          </a:xfrm>
-        </p:spPr>
-        <p:txBody>
-          <a:bodyPr>
-            <a:normAutofit/>
-          </a:bodyPr>
-          <a:lstStyle/>
-          <a:p>
-            <a:r>
-              <a:rPr lang="es-ES" dirty="0"/>
-              <a:t>Comparación de métodos exactos, heurísticos y aproximados</a:t>
-            </a:r>
-          </a:p>
-          <a:p>
-            <a:endParaRPr lang="es-ES" dirty="0"/>
-          </a:p>
-          <a:p>
-            <a:r>
-              <a:rPr lang="es-ES" dirty="0"/>
-              <a:t>Diego Acuña – TC – Marzo 2026</a:t>
-            </a:r>
+        <p:spPr/>
+        <p:txBody>
+          <a:bodyPr/>
+          <a:lstStyle/>
+          <a:p>
+            <a:r>
+              <a:rPr lang="es-UY" dirty="0"/>
+              <a:t>Edición Marzo 2026</a:t>
+            </a:r>
+            <a:endParaRPr lang="en-US" dirty="0"/>
           </a:p>
         </p:txBody>
       </p:sp>
     </p:spTree>
+    <p:extLst>
+      <p:ext uri="{BB962C8B-B14F-4D97-AF65-F5344CB8AC3E}">
+        <p14:creationId xmlns:p14="http://schemas.microsoft.com/office/powerpoint/2010/main" val="665420764"/>
+      </p:ext>
+    </p:extLst>
   </p:cSld>
   <p:clrMapOvr>
     <a:masterClrMapping/>
@@ -3195,6 +3209,1374 @@
 </file>
 
 <file path=ppt/slides/slide10.xml><?xml version="1.0" encoding="utf-8"?>
+<p:sld xmlns:a="http://schemas.openxmlformats.org/drawingml/2006/main" xmlns:r="http://schemas.openxmlformats.org/officeDocument/2006/relationships" xmlns:p="http://schemas.openxmlformats.org/presentationml/2006/main">
+  <p:cSld>
+    <p:spTree>
+      <p:nvGrpSpPr>
+        <p:cNvPr id="1" name=""/>
+        <p:cNvGrpSpPr/>
+        <p:nvPr/>
+      </p:nvGrpSpPr>
+      <p:grpSpPr>
+        <a:xfrm>
+          <a:off x="0" y="0"/>
+          <a:ext cx="0" cy="0"/>
+          <a:chOff x="0" y="0"/>
+          <a:chExt cx="0" cy="0"/>
+        </a:xfrm>
+      </p:grpSpPr>
+      <p:sp>
+        <p:nvSpPr>
+          <p:cNvPr id="2" name="Title 1">
+            <a:extLst>
+              <a:ext uri="{FF2B5EF4-FFF2-40B4-BE49-F238E27FC236}">
+                <a16:creationId xmlns:a16="http://schemas.microsoft.com/office/drawing/2014/main" id="{E3F9DB06-DF13-4D92-7DC4-2B3B9132CCE2}"/>
+              </a:ext>
+            </a:extLst>
+          </p:cNvPr>
+          <p:cNvSpPr>
+            <a:spLocks noGrp="1"/>
+          </p:cNvSpPr>
+          <p:nvPr>
+            <p:ph type="title"/>
+          </p:nvPr>
+        </p:nvSpPr>
+        <p:spPr/>
+        <p:txBody>
+          <a:bodyPr/>
+          <a:lstStyle/>
+          <a:p>
+            <a:r>
+              <a:rPr lang="es-UY" dirty="0"/>
+              <a:t>Bibliografía</a:t>
+            </a:r>
+            <a:endParaRPr lang="en-US" dirty="0"/>
+          </a:p>
+        </p:txBody>
+      </p:sp>
+      <p:sp>
+        <p:nvSpPr>
+          <p:cNvPr id="3" name="Content Placeholder 2">
+            <a:extLst>
+              <a:ext uri="{FF2B5EF4-FFF2-40B4-BE49-F238E27FC236}">
+                <a16:creationId xmlns:a16="http://schemas.microsoft.com/office/drawing/2014/main" id="{3F0FB1CD-EA68-9F94-8587-3C278CCA2A12}"/>
+              </a:ext>
+            </a:extLst>
+          </p:cNvPr>
+          <p:cNvSpPr>
+            <a:spLocks noGrp="1"/>
+          </p:cNvSpPr>
+          <p:nvPr>
+            <p:ph idx="1"/>
+          </p:nvPr>
+        </p:nvSpPr>
+        <p:spPr/>
+        <p:txBody>
+          <a:bodyPr/>
+          <a:lstStyle/>
+          <a:p>
+            <a:r>
+              <a:rPr lang="en-US" dirty="0"/>
+              <a:t>https://cs.uns.edu.ar/materias/tc2do/downloads/Apuntes/Funciones%20Recursivas-TdC2019.pdf</a:t>
+            </a:r>
+          </a:p>
+        </p:txBody>
+      </p:sp>
+    </p:spTree>
+    <p:extLst>
+      <p:ext uri="{BB962C8B-B14F-4D97-AF65-F5344CB8AC3E}">
+        <p14:creationId xmlns:p14="http://schemas.microsoft.com/office/powerpoint/2010/main" val="1241529128"/>
+      </p:ext>
+    </p:extLst>
+  </p:cSld>
+  <p:clrMapOvr>
+    <a:masterClrMapping/>
+  </p:clrMapOvr>
+</p:sld>
+</file>
+
+<file path=ppt/slides/slide11.xml><?xml version="1.0" encoding="utf-8"?>
+<p:sld xmlns:a="http://schemas.openxmlformats.org/drawingml/2006/main" xmlns:r="http://schemas.openxmlformats.org/officeDocument/2006/relationships" xmlns:p="http://schemas.openxmlformats.org/presentationml/2006/main">
+  <p:cSld>
+    <p:spTree>
+      <p:nvGrpSpPr>
+        <p:cNvPr id="1" name=""/>
+        <p:cNvGrpSpPr/>
+        <p:nvPr/>
+      </p:nvGrpSpPr>
+      <p:grpSpPr>
+        <a:xfrm>
+          <a:off x="0" y="0"/>
+          <a:ext cx="0" cy="0"/>
+          <a:chOff x="0" y="0"/>
+          <a:chExt cx="0" cy="0"/>
+        </a:xfrm>
+      </p:grpSpPr>
+      <p:sp>
+        <p:nvSpPr>
+          <p:cNvPr id="2" name="Title 1">
+            <a:extLst>
+              <a:ext uri="{FF2B5EF4-FFF2-40B4-BE49-F238E27FC236}">
+                <a16:creationId xmlns:a16="http://schemas.microsoft.com/office/drawing/2014/main" id="{651D80C5-86D6-912C-CCBE-56A459D5ADED}"/>
+              </a:ext>
+            </a:extLst>
+          </p:cNvPr>
+          <p:cNvSpPr>
+            <a:spLocks noGrp="1"/>
+          </p:cNvSpPr>
+          <p:nvPr>
+            <p:ph type="title"/>
+          </p:nvPr>
+        </p:nvSpPr>
+        <p:spPr>
+          <a:xfrm>
+            <a:off x="457200" y="274638"/>
+            <a:ext cx="8487508" cy="1143000"/>
+          </a:xfrm>
+        </p:spPr>
+        <p:txBody>
+          <a:bodyPr>
+            <a:normAutofit fontScale="90000"/>
+          </a:bodyPr>
+          <a:lstStyle/>
+          <a:p>
+            <a:r>
+              <a:rPr lang="en-US" dirty="0" err="1"/>
+              <a:t>Ejemplo</a:t>
+            </a:r>
+            <a:r>
+              <a:rPr lang="en-US" dirty="0"/>
+              <a:t> 1: </a:t>
+            </a:r>
+            <a:r>
+              <a:rPr lang="es-UY" dirty="0"/>
+              <a:t>¿Termina para toda entrada?</a:t>
+            </a:r>
+            <a:endParaRPr lang="en-US" dirty="0"/>
+          </a:p>
+        </p:txBody>
+      </p:sp>
+      <p:sp>
+        <p:nvSpPr>
+          <p:cNvPr id="3" name="Content Placeholder 2">
+            <a:extLst>
+              <a:ext uri="{FF2B5EF4-FFF2-40B4-BE49-F238E27FC236}">
+                <a16:creationId xmlns:a16="http://schemas.microsoft.com/office/drawing/2014/main" id="{05999D3F-5F2B-693F-B2B0-5FBA6B78AA37}"/>
+              </a:ext>
+            </a:extLst>
+          </p:cNvPr>
+          <p:cNvSpPr>
+            <a:spLocks noGrp="1"/>
+          </p:cNvSpPr>
+          <p:nvPr>
+            <p:ph idx="1"/>
+          </p:nvPr>
+        </p:nvSpPr>
+        <p:spPr/>
+        <p:txBody>
+          <a:bodyPr/>
+          <a:lstStyle/>
+          <a:p>
+            <a:pPr marL="0" indent="0">
+              <a:buNone/>
+            </a:pPr>
+            <a:endParaRPr lang="es-UY" dirty="0"/>
+          </a:p>
+          <a:p>
+            <a:pPr marL="0" indent="0">
+              <a:buNone/>
+            </a:pPr>
+            <a:endParaRPr lang="es-UY" dirty="0"/>
+          </a:p>
+          <a:p>
+            <a:pPr marL="0" indent="0">
+              <a:buNone/>
+            </a:pPr>
+            <a:r>
+              <a:rPr lang="es-UY" dirty="0" err="1"/>
+              <a:t>int</a:t>
+            </a:r>
+            <a:r>
+              <a:rPr lang="es-UY" dirty="0"/>
+              <a:t> f (</a:t>
+            </a:r>
+            <a:r>
+              <a:rPr lang="es-UY" dirty="0" err="1"/>
+              <a:t>int</a:t>
+            </a:r>
+            <a:r>
+              <a:rPr lang="es-UY" dirty="0"/>
+              <a:t> x, </a:t>
+            </a:r>
+            <a:r>
+              <a:rPr lang="es-UY" dirty="0" err="1"/>
+              <a:t>int</a:t>
+            </a:r>
+            <a:r>
+              <a:rPr lang="es-UY" dirty="0"/>
+              <a:t> y) </a:t>
+            </a:r>
+            <a:r>
+              <a:rPr lang="en-US" dirty="0"/>
+              <a:t>{</a:t>
+            </a:r>
+          </a:p>
+          <a:p>
+            <a:pPr marL="0" indent="0">
+              <a:buNone/>
+            </a:pPr>
+            <a:r>
+              <a:rPr lang="en-US" dirty="0"/>
+              <a:t>	return x + y</a:t>
+            </a:r>
+          </a:p>
+          <a:p>
+            <a:pPr marL="0" indent="0">
+              <a:buNone/>
+            </a:pPr>
+            <a:r>
+              <a:rPr lang="en-US" dirty="0"/>
+              <a:t>}</a:t>
+            </a:r>
+          </a:p>
+        </p:txBody>
+      </p:sp>
+    </p:spTree>
+    <p:extLst>
+      <p:ext uri="{BB962C8B-B14F-4D97-AF65-F5344CB8AC3E}">
+        <p14:creationId xmlns:p14="http://schemas.microsoft.com/office/powerpoint/2010/main" val="2109281439"/>
+      </p:ext>
+    </p:extLst>
+  </p:cSld>
+  <p:clrMapOvr>
+    <a:masterClrMapping/>
+  </p:clrMapOvr>
+</p:sld>
+</file>
+
+<file path=ppt/slides/slide12.xml><?xml version="1.0" encoding="utf-8"?>
+<p:sld xmlns:a="http://schemas.openxmlformats.org/drawingml/2006/main" xmlns:r="http://schemas.openxmlformats.org/officeDocument/2006/relationships" xmlns:p="http://schemas.openxmlformats.org/presentationml/2006/main">
+  <p:cSld>
+    <p:spTree>
+      <p:nvGrpSpPr>
+        <p:cNvPr id="1" name="">
+          <a:extLst>
+            <a:ext uri="{FF2B5EF4-FFF2-40B4-BE49-F238E27FC236}">
+              <a16:creationId xmlns:a16="http://schemas.microsoft.com/office/drawing/2014/main" id="{F50226EE-4998-59AB-AD49-83A89FFF15E4}"/>
+            </a:ext>
+          </a:extLst>
+        </p:cNvPr>
+        <p:cNvGrpSpPr/>
+        <p:nvPr/>
+      </p:nvGrpSpPr>
+      <p:grpSpPr>
+        <a:xfrm>
+          <a:off x="0" y="0"/>
+          <a:ext cx="0" cy="0"/>
+          <a:chOff x="0" y="0"/>
+          <a:chExt cx="0" cy="0"/>
+        </a:xfrm>
+      </p:grpSpPr>
+      <p:sp>
+        <p:nvSpPr>
+          <p:cNvPr id="2" name="Title 1">
+            <a:extLst>
+              <a:ext uri="{FF2B5EF4-FFF2-40B4-BE49-F238E27FC236}">
+                <a16:creationId xmlns:a16="http://schemas.microsoft.com/office/drawing/2014/main" id="{4D2686E0-52D0-2730-BADC-53E4B8F65646}"/>
+              </a:ext>
+            </a:extLst>
+          </p:cNvPr>
+          <p:cNvSpPr>
+            <a:spLocks noGrp="1"/>
+          </p:cNvSpPr>
+          <p:nvPr>
+            <p:ph type="title"/>
+          </p:nvPr>
+        </p:nvSpPr>
+        <p:spPr>
+          <a:xfrm>
+            <a:off x="457200" y="274638"/>
+            <a:ext cx="8487508" cy="1143000"/>
+          </a:xfrm>
+        </p:spPr>
+        <p:txBody>
+          <a:bodyPr>
+            <a:normAutofit fontScale="90000"/>
+          </a:bodyPr>
+          <a:lstStyle/>
+          <a:p>
+            <a:r>
+              <a:rPr lang="en-US" dirty="0" err="1"/>
+              <a:t>Ejemplo</a:t>
+            </a:r>
+            <a:r>
+              <a:rPr lang="en-US" dirty="0"/>
+              <a:t> 2: </a:t>
+            </a:r>
+            <a:r>
+              <a:rPr lang="es-UY" dirty="0"/>
+              <a:t>¿Termina para toda entrada?</a:t>
+            </a:r>
+            <a:endParaRPr lang="en-US" dirty="0"/>
+          </a:p>
+        </p:txBody>
+      </p:sp>
+      <p:sp>
+        <p:nvSpPr>
+          <p:cNvPr id="3" name="Content Placeholder 2">
+            <a:extLst>
+              <a:ext uri="{FF2B5EF4-FFF2-40B4-BE49-F238E27FC236}">
+                <a16:creationId xmlns:a16="http://schemas.microsoft.com/office/drawing/2014/main" id="{D932842D-6DC9-E617-82CF-E9D9EBA2A135}"/>
+              </a:ext>
+            </a:extLst>
+          </p:cNvPr>
+          <p:cNvSpPr>
+            <a:spLocks noGrp="1"/>
+          </p:cNvSpPr>
+          <p:nvPr>
+            <p:ph idx="1"/>
+          </p:nvPr>
+        </p:nvSpPr>
+        <p:spPr/>
+        <p:txBody>
+          <a:bodyPr/>
+          <a:lstStyle/>
+          <a:p>
+            <a:pPr marL="0" indent="0">
+              <a:buNone/>
+            </a:pPr>
+            <a:endParaRPr lang="es-UY" dirty="0"/>
+          </a:p>
+          <a:p>
+            <a:pPr marL="0" indent="0">
+              <a:buNone/>
+            </a:pPr>
+            <a:endParaRPr lang="es-UY" dirty="0"/>
+          </a:p>
+          <a:p>
+            <a:pPr marL="0" indent="0">
+              <a:buNone/>
+            </a:pPr>
+            <a:r>
+              <a:rPr lang="es-UY" dirty="0" err="1"/>
+              <a:t>int</a:t>
+            </a:r>
+            <a:r>
+              <a:rPr lang="es-UY" dirty="0"/>
+              <a:t> f (</a:t>
+            </a:r>
+            <a:r>
+              <a:rPr lang="es-UY" dirty="0" err="1"/>
+              <a:t>int</a:t>
+            </a:r>
+            <a:r>
+              <a:rPr lang="es-UY" dirty="0"/>
+              <a:t> x, </a:t>
+            </a:r>
+            <a:r>
+              <a:rPr lang="es-UY" dirty="0" err="1"/>
+              <a:t>int</a:t>
+            </a:r>
+            <a:r>
+              <a:rPr lang="es-UY" dirty="0"/>
+              <a:t> y) </a:t>
+            </a:r>
+            <a:r>
+              <a:rPr lang="en-US" dirty="0"/>
+              <a:t>{</a:t>
+            </a:r>
+          </a:p>
+          <a:p>
+            <a:pPr marL="0" indent="0">
+              <a:buNone/>
+            </a:pPr>
+            <a:r>
+              <a:rPr lang="en-US" dirty="0"/>
+              <a:t>	return x / y</a:t>
+            </a:r>
+          </a:p>
+          <a:p>
+            <a:pPr marL="0" indent="0">
+              <a:buNone/>
+            </a:pPr>
+            <a:r>
+              <a:rPr lang="en-US" dirty="0"/>
+              <a:t>}</a:t>
+            </a:r>
+          </a:p>
+        </p:txBody>
+      </p:sp>
+    </p:spTree>
+    <p:extLst>
+      <p:ext uri="{BB962C8B-B14F-4D97-AF65-F5344CB8AC3E}">
+        <p14:creationId xmlns:p14="http://schemas.microsoft.com/office/powerpoint/2010/main" val="2513385391"/>
+      </p:ext>
+    </p:extLst>
+  </p:cSld>
+  <p:clrMapOvr>
+    <a:masterClrMapping/>
+  </p:clrMapOvr>
+</p:sld>
+</file>
+
+<file path=ppt/slides/slide13.xml><?xml version="1.0" encoding="utf-8"?>
+<p:sld xmlns:a="http://schemas.openxmlformats.org/drawingml/2006/main" xmlns:r="http://schemas.openxmlformats.org/officeDocument/2006/relationships" xmlns:p="http://schemas.openxmlformats.org/presentationml/2006/main">
+  <p:cSld>
+    <p:spTree>
+      <p:nvGrpSpPr>
+        <p:cNvPr id="1" name="">
+          <a:extLst>
+            <a:ext uri="{FF2B5EF4-FFF2-40B4-BE49-F238E27FC236}">
+              <a16:creationId xmlns:a16="http://schemas.microsoft.com/office/drawing/2014/main" id="{A5B2A4B8-5874-20EC-7AE9-D80B62393FC0}"/>
+            </a:ext>
+          </a:extLst>
+        </p:cNvPr>
+        <p:cNvGrpSpPr/>
+        <p:nvPr/>
+      </p:nvGrpSpPr>
+      <p:grpSpPr>
+        <a:xfrm>
+          <a:off x="0" y="0"/>
+          <a:ext cx="0" cy="0"/>
+          <a:chOff x="0" y="0"/>
+          <a:chExt cx="0" cy="0"/>
+        </a:xfrm>
+      </p:grpSpPr>
+      <p:sp>
+        <p:nvSpPr>
+          <p:cNvPr id="2" name="Title 1">
+            <a:extLst>
+              <a:ext uri="{FF2B5EF4-FFF2-40B4-BE49-F238E27FC236}">
+                <a16:creationId xmlns:a16="http://schemas.microsoft.com/office/drawing/2014/main" id="{F6DEA4AB-66E8-3BDC-84A0-3FBF92C7B266}"/>
+              </a:ext>
+            </a:extLst>
+          </p:cNvPr>
+          <p:cNvSpPr>
+            <a:spLocks noGrp="1"/>
+          </p:cNvSpPr>
+          <p:nvPr>
+            <p:ph type="title"/>
+          </p:nvPr>
+        </p:nvSpPr>
+        <p:spPr>
+          <a:xfrm>
+            <a:off x="457200" y="274638"/>
+            <a:ext cx="8487508" cy="1143000"/>
+          </a:xfrm>
+        </p:spPr>
+        <p:txBody>
+          <a:bodyPr>
+            <a:normAutofit fontScale="90000"/>
+          </a:bodyPr>
+          <a:lstStyle/>
+          <a:p>
+            <a:r>
+              <a:rPr lang="en-US" dirty="0" err="1"/>
+              <a:t>Ejemplo</a:t>
+            </a:r>
+            <a:r>
+              <a:rPr lang="en-US" dirty="0"/>
+              <a:t> 3: </a:t>
+            </a:r>
+            <a:r>
+              <a:rPr lang="es-UY" dirty="0"/>
+              <a:t>¿Termina para toda entrada?</a:t>
+            </a:r>
+            <a:endParaRPr lang="en-US" dirty="0"/>
+          </a:p>
+        </p:txBody>
+      </p:sp>
+      <p:sp>
+        <p:nvSpPr>
+          <p:cNvPr id="3" name="Content Placeholder 2">
+            <a:extLst>
+              <a:ext uri="{FF2B5EF4-FFF2-40B4-BE49-F238E27FC236}">
+                <a16:creationId xmlns:a16="http://schemas.microsoft.com/office/drawing/2014/main" id="{91E4F83D-FB49-90D4-DAD1-59F7FB13305F}"/>
+              </a:ext>
+            </a:extLst>
+          </p:cNvPr>
+          <p:cNvSpPr>
+            <a:spLocks noGrp="1"/>
+          </p:cNvSpPr>
+          <p:nvPr>
+            <p:ph idx="1"/>
+          </p:nvPr>
+        </p:nvSpPr>
+        <p:spPr/>
+        <p:txBody>
+          <a:bodyPr/>
+          <a:lstStyle/>
+          <a:p>
+            <a:pPr marL="0" indent="0">
+              <a:buNone/>
+            </a:pPr>
+            <a:endParaRPr lang="es-UY" dirty="0"/>
+          </a:p>
+          <a:p>
+            <a:pPr marL="0" indent="0">
+              <a:buNone/>
+            </a:pPr>
+            <a:endParaRPr lang="es-UY" dirty="0"/>
+          </a:p>
+          <a:p>
+            <a:pPr marL="0" indent="0">
+              <a:buNone/>
+            </a:pPr>
+            <a:r>
+              <a:rPr lang="es-UY" dirty="0" err="1"/>
+              <a:t>int</a:t>
+            </a:r>
+            <a:r>
+              <a:rPr lang="es-UY" dirty="0"/>
+              <a:t> f (</a:t>
+            </a:r>
+            <a:r>
+              <a:rPr lang="es-UY" dirty="0" err="1"/>
+              <a:t>int</a:t>
+            </a:r>
+            <a:r>
+              <a:rPr lang="es-UY" dirty="0"/>
+              <a:t> x, </a:t>
+            </a:r>
+            <a:r>
+              <a:rPr lang="es-UY" dirty="0" err="1"/>
+              <a:t>int</a:t>
+            </a:r>
+            <a:r>
+              <a:rPr lang="es-UY" dirty="0"/>
+              <a:t> y) </a:t>
+            </a:r>
+            <a:r>
+              <a:rPr lang="en-US" dirty="0"/>
+              <a:t>{</a:t>
+            </a:r>
+          </a:p>
+          <a:p>
+            <a:pPr marL="0" indent="0">
+              <a:buNone/>
+            </a:pPr>
+            <a:r>
+              <a:rPr lang="en-US" dirty="0"/>
+              <a:t>	while (true){}</a:t>
+            </a:r>
+          </a:p>
+          <a:p>
+            <a:pPr marL="0" indent="0">
+              <a:buNone/>
+            </a:pPr>
+            <a:r>
+              <a:rPr lang="en-US" dirty="0"/>
+              <a:t>	return 0;</a:t>
+            </a:r>
+          </a:p>
+          <a:p>
+            <a:pPr marL="0" indent="0">
+              <a:buNone/>
+            </a:pPr>
+            <a:r>
+              <a:rPr lang="en-US" dirty="0"/>
+              <a:t>}</a:t>
+            </a:r>
+          </a:p>
+        </p:txBody>
+      </p:sp>
+    </p:spTree>
+    <p:extLst>
+      <p:ext uri="{BB962C8B-B14F-4D97-AF65-F5344CB8AC3E}">
+        <p14:creationId xmlns:p14="http://schemas.microsoft.com/office/powerpoint/2010/main" val="1289822110"/>
+      </p:ext>
+    </p:extLst>
+  </p:cSld>
+  <p:clrMapOvr>
+    <a:masterClrMapping/>
+  </p:clrMapOvr>
+</p:sld>
+</file>
+
+<file path=ppt/slides/slide14.xml><?xml version="1.0" encoding="utf-8"?>
+<p:sld xmlns:a="http://schemas.openxmlformats.org/drawingml/2006/main" xmlns:r="http://schemas.openxmlformats.org/officeDocument/2006/relationships" xmlns:p="http://schemas.openxmlformats.org/presentationml/2006/main">
+  <p:cSld>
+    <p:spTree>
+      <p:nvGrpSpPr>
+        <p:cNvPr id="1" name="">
+          <a:extLst>
+            <a:ext uri="{FF2B5EF4-FFF2-40B4-BE49-F238E27FC236}">
+              <a16:creationId xmlns:a16="http://schemas.microsoft.com/office/drawing/2014/main" id="{0F9FD9E7-D79C-7905-3F11-4A5BD8EC11F4}"/>
+            </a:ext>
+          </a:extLst>
+        </p:cNvPr>
+        <p:cNvGrpSpPr/>
+        <p:nvPr/>
+      </p:nvGrpSpPr>
+      <p:grpSpPr>
+        <a:xfrm>
+          <a:off x="0" y="0"/>
+          <a:ext cx="0" cy="0"/>
+          <a:chOff x="0" y="0"/>
+          <a:chExt cx="0" cy="0"/>
+        </a:xfrm>
+      </p:grpSpPr>
+      <p:sp>
+        <p:nvSpPr>
+          <p:cNvPr id="2" name="Title 1">
+            <a:extLst>
+              <a:ext uri="{FF2B5EF4-FFF2-40B4-BE49-F238E27FC236}">
+                <a16:creationId xmlns:a16="http://schemas.microsoft.com/office/drawing/2014/main" id="{B9F79499-FEAB-6A65-8603-42C0CF234FA0}"/>
+              </a:ext>
+            </a:extLst>
+          </p:cNvPr>
+          <p:cNvSpPr>
+            <a:spLocks noGrp="1"/>
+          </p:cNvSpPr>
+          <p:nvPr>
+            <p:ph type="title"/>
+          </p:nvPr>
+        </p:nvSpPr>
+        <p:spPr>
+          <a:xfrm>
+            <a:off x="457200" y="274638"/>
+            <a:ext cx="8487508" cy="1143000"/>
+          </a:xfrm>
+        </p:spPr>
+        <p:txBody>
+          <a:bodyPr>
+            <a:normAutofit fontScale="90000"/>
+          </a:bodyPr>
+          <a:lstStyle/>
+          <a:p>
+            <a:r>
+              <a:rPr lang="en-US" dirty="0" err="1"/>
+              <a:t>Ejemplo</a:t>
+            </a:r>
+            <a:r>
+              <a:rPr lang="en-US" dirty="0"/>
+              <a:t> 4: </a:t>
+            </a:r>
+            <a:r>
+              <a:rPr lang="es-UY" dirty="0"/>
+              <a:t>¿Termina para toda entrada?</a:t>
+            </a:r>
+            <a:endParaRPr lang="en-US" dirty="0"/>
+          </a:p>
+        </p:txBody>
+      </p:sp>
+      <p:sp>
+        <p:nvSpPr>
+          <p:cNvPr id="3" name="Content Placeholder 2">
+            <a:extLst>
+              <a:ext uri="{FF2B5EF4-FFF2-40B4-BE49-F238E27FC236}">
+                <a16:creationId xmlns:a16="http://schemas.microsoft.com/office/drawing/2014/main" id="{8AD248E1-A697-97BC-D57F-114A53E10BEC}"/>
+              </a:ext>
+            </a:extLst>
+          </p:cNvPr>
+          <p:cNvSpPr>
+            <a:spLocks noGrp="1"/>
+          </p:cNvSpPr>
+          <p:nvPr>
+            <p:ph idx="1"/>
+          </p:nvPr>
+        </p:nvSpPr>
+        <p:spPr/>
+        <p:txBody>
+          <a:bodyPr>
+            <a:normAutofit fontScale="92500" lnSpcReduction="20000"/>
+          </a:bodyPr>
+          <a:lstStyle/>
+          <a:p>
+            <a:pPr marL="0" indent="0">
+              <a:buNone/>
+            </a:pPr>
+            <a:endParaRPr lang="es-UY" dirty="0"/>
+          </a:p>
+          <a:p>
+            <a:pPr marL="0" indent="0">
+              <a:buNone/>
+            </a:pPr>
+            <a:endParaRPr lang="es-UY" dirty="0"/>
+          </a:p>
+          <a:p>
+            <a:pPr marL="0" indent="0">
+              <a:buNone/>
+            </a:pPr>
+            <a:r>
+              <a:rPr lang="es-UY" dirty="0" err="1"/>
+              <a:t>int</a:t>
+            </a:r>
+            <a:r>
+              <a:rPr lang="es-UY" dirty="0"/>
+              <a:t> f (</a:t>
+            </a:r>
+            <a:r>
+              <a:rPr lang="es-UY" dirty="0" err="1"/>
+              <a:t>int</a:t>
+            </a:r>
+            <a:r>
+              <a:rPr lang="es-UY" dirty="0"/>
+              <a:t> n) </a:t>
+            </a:r>
+            <a:r>
+              <a:rPr lang="en-US" dirty="0"/>
+              <a:t>{</a:t>
+            </a:r>
+          </a:p>
+          <a:p>
+            <a:pPr marL="0" indent="0">
+              <a:buNone/>
+            </a:pPr>
+            <a:r>
+              <a:rPr lang="en-US" dirty="0"/>
+              <a:t>	if ( n == 0 ) { </a:t>
+            </a:r>
+          </a:p>
+          <a:p>
+            <a:pPr marL="0" indent="0">
+              <a:buNone/>
+            </a:pPr>
+            <a:r>
+              <a:rPr lang="en-US" dirty="0"/>
+              <a:t>		return  f(0);</a:t>
+            </a:r>
+          </a:p>
+          <a:p>
+            <a:pPr marL="0" indent="0">
+              <a:buNone/>
+            </a:pPr>
+            <a:r>
+              <a:rPr lang="en-US" dirty="0"/>
+              <a:t>	} else {</a:t>
+            </a:r>
+          </a:p>
+          <a:p>
+            <a:pPr marL="0" indent="0">
+              <a:buNone/>
+            </a:pPr>
+            <a:r>
+              <a:rPr lang="en-US" dirty="0"/>
+              <a:t>		return 0;</a:t>
+            </a:r>
+          </a:p>
+          <a:p>
+            <a:pPr marL="0" indent="0">
+              <a:buNone/>
+            </a:pPr>
+            <a:r>
+              <a:rPr lang="en-US" dirty="0"/>
+              <a:t>	}	</a:t>
+            </a:r>
+          </a:p>
+          <a:p>
+            <a:pPr marL="0" indent="0">
+              <a:buNone/>
+            </a:pPr>
+            <a:r>
+              <a:rPr lang="en-US" dirty="0"/>
+              <a:t>}</a:t>
+            </a:r>
+          </a:p>
+        </p:txBody>
+      </p:sp>
+    </p:spTree>
+    <p:extLst>
+      <p:ext uri="{BB962C8B-B14F-4D97-AF65-F5344CB8AC3E}">
+        <p14:creationId xmlns:p14="http://schemas.microsoft.com/office/powerpoint/2010/main" val="3307850436"/>
+      </p:ext>
+    </p:extLst>
+  </p:cSld>
+  <p:clrMapOvr>
+    <a:masterClrMapping/>
+  </p:clrMapOvr>
+</p:sld>
+</file>
+
+<file path=ppt/slides/slide15.xml><?xml version="1.0" encoding="utf-8"?>
+<p:sld xmlns:a="http://schemas.openxmlformats.org/drawingml/2006/main" xmlns:r="http://schemas.openxmlformats.org/officeDocument/2006/relationships" xmlns:p="http://schemas.openxmlformats.org/presentationml/2006/main">
+  <p:cSld>
+    <p:spTree>
+      <p:nvGrpSpPr>
+        <p:cNvPr id="1" name="">
+          <a:extLst>
+            <a:ext uri="{FF2B5EF4-FFF2-40B4-BE49-F238E27FC236}">
+              <a16:creationId xmlns:a16="http://schemas.microsoft.com/office/drawing/2014/main" id="{B269735A-3709-920C-A254-2B7BC4DB6B36}"/>
+            </a:ext>
+          </a:extLst>
+        </p:cNvPr>
+        <p:cNvGrpSpPr/>
+        <p:nvPr/>
+      </p:nvGrpSpPr>
+      <p:grpSpPr>
+        <a:xfrm>
+          <a:off x="0" y="0"/>
+          <a:ext cx="0" cy="0"/>
+          <a:chOff x="0" y="0"/>
+          <a:chExt cx="0" cy="0"/>
+        </a:xfrm>
+      </p:grpSpPr>
+      <p:sp>
+        <p:nvSpPr>
+          <p:cNvPr id="2" name="Title 1">
+            <a:extLst>
+              <a:ext uri="{FF2B5EF4-FFF2-40B4-BE49-F238E27FC236}">
+                <a16:creationId xmlns:a16="http://schemas.microsoft.com/office/drawing/2014/main" id="{781B792C-845C-890D-F181-A2AFF256F078}"/>
+              </a:ext>
+            </a:extLst>
+          </p:cNvPr>
+          <p:cNvSpPr>
+            <a:spLocks noGrp="1"/>
+          </p:cNvSpPr>
+          <p:nvPr>
+            <p:ph type="title"/>
+          </p:nvPr>
+        </p:nvSpPr>
+        <p:spPr>
+          <a:xfrm>
+            <a:off x="457200" y="274638"/>
+            <a:ext cx="8487508" cy="1143000"/>
+          </a:xfrm>
+        </p:spPr>
+        <p:txBody>
+          <a:bodyPr>
+            <a:normAutofit fontScale="90000"/>
+          </a:bodyPr>
+          <a:lstStyle/>
+          <a:p>
+            <a:r>
+              <a:rPr lang="en-US" dirty="0" err="1"/>
+              <a:t>Ejemplo</a:t>
+            </a:r>
+            <a:r>
+              <a:rPr lang="en-US" dirty="0"/>
+              <a:t> 5: </a:t>
+            </a:r>
+            <a:r>
+              <a:rPr lang="es-UY" dirty="0"/>
+              <a:t>¿Termina para toda entrada?</a:t>
+            </a:r>
+            <a:endParaRPr lang="en-US" dirty="0"/>
+          </a:p>
+        </p:txBody>
+      </p:sp>
+      <p:sp>
+        <p:nvSpPr>
+          <p:cNvPr id="3" name="Content Placeholder 2">
+            <a:extLst>
+              <a:ext uri="{FF2B5EF4-FFF2-40B4-BE49-F238E27FC236}">
+                <a16:creationId xmlns:a16="http://schemas.microsoft.com/office/drawing/2014/main" id="{0D8A5051-3C51-CDBA-1D1A-108E54A318A9}"/>
+              </a:ext>
+            </a:extLst>
+          </p:cNvPr>
+          <p:cNvSpPr>
+            <a:spLocks noGrp="1"/>
+          </p:cNvSpPr>
+          <p:nvPr>
+            <p:ph idx="1"/>
+          </p:nvPr>
+        </p:nvSpPr>
+        <p:spPr/>
+        <p:txBody>
+          <a:bodyPr>
+            <a:normAutofit lnSpcReduction="10000"/>
+          </a:bodyPr>
+          <a:lstStyle/>
+          <a:p>
+            <a:pPr marL="0" indent="0">
+              <a:buNone/>
+            </a:pPr>
+            <a:r>
+              <a:rPr lang="es-UY" dirty="0" err="1"/>
+              <a:t>int</a:t>
+            </a:r>
+            <a:r>
+              <a:rPr lang="es-UY" dirty="0"/>
+              <a:t> f (</a:t>
+            </a:r>
+            <a:r>
+              <a:rPr lang="es-UY" dirty="0" err="1"/>
+              <a:t>int</a:t>
+            </a:r>
+            <a:r>
+              <a:rPr lang="es-UY" dirty="0"/>
+              <a:t> n) </a:t>
+            </a:r>
+            <a:r>
+              <a:rPr lang="en-US" dirty="0"/>
+              <a:t>{</a:t>
+            </a:r>
+          </a:p>
+          <a:p>
+            <a:pPr marL="0" indent="0">
+              <a:buNone/>
+            </a:pPr>
+            <a:r>
+              <a:rPr lang="en-US" dirty="0"/>
+              <a:t>	if ( n == 1 ) { </a:t>
+            </a:r>
+          </a:p>
+          <a:p>
+            <a:pPr marL="0" indent="0">
+              <a:buNone/>
+            </a:pPr>
+            <a:r>
+              <a:rPr lang="en-US" dirty="0"/>
+              <a:t>		return  1;</a:t>
+            </a:r>
+          </a:p>
+          <a:p>
+            <a:pPr marL="0" indent="0">
+              <a:buNone/>
+            </a:pPr>
+            <a:r>
+              <a:rPr lang="en-US" dirty="0"/>
+              <a:t>	} else {</a:t>
+            </a:r>
+          </a:p>
+          <a:p>
+            <a:pPr marL="0" indent="0">
+              <a:buNone/>
+            </a:pPr>
+            <a:r>
+              <a:rPr lang="en-US" dirty="0"/>
+              <a:t>		if (n % 2  == 0 ) { return f(n/2) }</a:t>
+            </a:r>
+          </a:p>
+          <a:p>
+            <a:pPr marL="0" indent="0">
+              <a:buNone/>
+            </a:pPr>
+            <a:r>
+              <a:rPr lang="en-US" dirty="0"/>
+              <a:t>		else { return f(3*n+1) }</a:t>
+            </a:r>
+          </a:p>
+          <a:p>
+            <a:pPr marL="0" indent="0">
+              <a:buNone/>
+            </a:pPr>
+            <a:r>
+              <a:rPr lang="en-US" dirty="0"/>
+              <a:t>	}	</a:t>
+            </a:r>
+          </a:p>
+          <a:p>
+            <a:pPr marL="0" indent="0">
+              <a:buNone/>
+            </a:pPr>
+            <a:r>
+              <a:rPr lang="en-US" dirty="0"/>
+              <a:t>}</a:t>
+            </a:r>
+          </a:p>
+        </p:txBody>
+      </p:sp>
+    </p:spTree>
+    <p:extLst>
+      <p:ext uri="{BB962C8B-B14F-4D97-AF65-F5344CB8AC3E}">
+        <p14:creationId xmlns:p14="http://schemas.microsoft.com/office/powerpoint/2010/main" val="360950416"/>
+      </p:ext>
+    </p:extLst>
+  </p:cSld>
+  <p:clrMapOvr>
+    <a:masterClrMapping/>
+  </p:clrMapOvr>
+</p:sld>
+</file>
+
+<file path=ppt/slides/slide16.xml><?xml version="1.0" encoding="utf-8"?>
+<p:sld xmlns:a="http://schemas.openxmlformats.org/drawingml/2006/main" xmlns:r="http://schemas.openxmlformats.org/officeDocument/2006/relationships" xmlns:p="http://schemas.openxmlformats.org/presentationml/2006/main">
+  <p:cSld>
+    <p:spTree>
+      <p:nvGrpSpPr>
+        <p:cNvPr id="1" name=""/>
+        <p:cNvGrpSpPr/>
+        <p:nvPr/>
+      </p:nvGrpSpPr>
+      <p:grpSpPr>
+        <a:xfrm>
+          <a:off x="0" y="0"/>
+          <a:ext cx="0" cy="0"/>
+          <a:chOff x="0" y="0"/>
+          <a:chExt cx="0" cy="0"/>
+        </a:xfrm>
+      </p:grpSpPr>
+      <p:sp>
+        <p:nvSpPr>
+          <p:cNvPr id="2" name="Title 1">
+            <a:extLst>
+              <a:ext uri="{FF2B5EF4-FFF2-40B4-BE49-F238E27FC236}">
+                <a16:creationId xmlns:a16="http://schemas.microsoft.com/office/drawing/2014/main" id="{79420FB2-89A6-E3E8-7277-113C3F3D81C5}"/>
+              </a:ext>
+            </a:extLst>
+          </p:cNvPr>
+          <p:cNvSpPr>
+            <a:spLocks noGrp="1"/>
+          </p:cNvSpPr>
+          <p:nvPr>
+            <p:ph type="title"/>
+          </p:nvPr>
+        </p:nvSpPr>
+        <p:spPr/>
+        <p:txBody>
+          <a:bodyPr/>
+          <a:lstStyle/>
+          <a:p>
+            <a:r>
+              <a:rPr lang="en-US" dirty="0" err="1"/>
+              <a:t>Conjetura</a:t>
+            </a:r>
+            <a:r>
+              <a:rPr lang="en-US" dirty="0"/>
+              <a:t> de Collatz</a:t>
+            </a:r>
+          </a:p>
+        </p:txBody>
+      </p:sp>
+      <p:sp>
+        <p:nvSpPr>
+          <p:cNvPr id="3" name="Content Placeholder 2">
+            <a:extLst>
+              <a:ext uri="{FF2B5EF4-FFF2-40B4-BE49-F238E27FC236}">
+                <a16:creationId xmlns:a16="http://schemas.microsoft.com/office/drawing/2014/main" id="{FB808639-51D8-A4E4-02BB-C9F6070B04C8}"/>
+              </a:ext>
+            </a:extLst>
+          </p:cNvPr>
+          <p:cNvSpPr>
+            <a:spLocks noGrp="1"/>
+          </p:cNvSpPr>
+          <p:nvPr>
+            <p:ph idx="1"/>
+          </p:nvPr>
+        </p:nvSpPr>
+        <p:spPr/>
+        <p:txBody>
+          <a:bodyPr/>
+          <a:lstStyle/>
+          <a:p>
+            <a:endParaRPr lang="en-US"/>
+          </a:p>
+        </p:txBody>
+      </p:sp>
+      <p:pic>
+        <p:nvPicPr>
+          <p:cNvPr id="1026" name="Picture 2" descr="undefined">
+            <a:extLst>
+              <a:ext uri="{FF2B5EF4-FFF2-40B4-BE49-F238E27FC236}">
+                <a16:creationId xmlns:a16="http://schemas.microsoft.com/office/drawing/2014/main" id="{A124755E-246F-DC41-21A0-A5802916DC3D}"/>
+              </a:ext>
+            </a:extLst>
+          </p:cNvPr>
+          <p:cNvPicPr>
+            <a:picLocks noChangeAspect="1" noChangeArrowheads="1"/>
+          </p:cNvPicPr>
+          <p:nvPr/>
+        </p:nvPicPr>
+        <p:blipFill>
+          <a:blip r:embed="rId2">
+            <a:extLst>
+              <a:ext uri="{28A0092B-C50C-407E-A947-70E740481C1C}">
+                <a14:useLocalDpi xmlns:a14="http://schemas.microsoft.com/office/drawing/2010/main" val="0"/>
+              </a:ext>
+            </a:extLst>
+          </a:blip>
+          <a:srcRect/>
+          <a:stretch>
+            <a:fillRect/>
+          </a:stretch>
+        </p:blipFill>
+        <p:spPr bwMode="auto">
+          <a:xfrm>
+            <a:off x="457200" y="1371600"/>
+            <a:ext cx="8686800" cy="4343400"/>
+          </a:xfrm>
+          <a:prstGeom prst="rect">
+            <a:avLst/>
+          </a:prstGeom>
+          <a:noFill/>
+          <a:extLst>
+            <a:ext uri="{909E8E84-426E-40DD-AFC4-6F175D3DCCD1}">
+              <a14:hiddenFill xmlns:a14="http://schemas.microsoft.com/office/drawing/2010/main">
+                <a:solidFill>
+                  <a:srgbClr val="FFFFFF"/>
+                </a:solidFill>
+              </a14:hiddenFill>
+            </a:ext>
+          </a:extLst>
+        </p:spPr>
+      </p:pic>
+    </p:spTree>
+    <p:extLst>
+      <p:ext uri="{BB962C8B-B14F-4D97-AF65-F5344CB8AC3E}">
+        <p14:creationId xmlns:p14="http://schemas.microsoft.com/office/powerpoint/2010/main" val="358580910"/>
+      </p:ext>
+    </p:extLst>
+  </p:cSld>
+  <p:clrMapOvr>
+    <a:masterClrMapping/>
+  </p:clrMapOvr>
+</p:sld>
+</file>
+
+<file path=ppt/slides/slide17.xml><?xml version="1.0" encoding="utf-8"?>
+<p:sld xmlns:a="http://schemas.openxmlformats.org/drawingml/2006/main" xmlns:r="http://schemas.openxmlformats.org/officeDocument/2006/relationships" xmlns:p="http://schemas.openxmlformats.org/presentationml/2006/main">
+  <p:cSld>
+    <p:spTree>
+      <p:nvGrpSpPr>
+        <p:cNvPr id="1" name=""/>
+        <p:cNvGrpSpPr/>
+        <p:nvPr/>
+      </p:nvGrpSpPr>
+      <p:grpSpPr>
+        <a:xfrm>
+          <a:off x="0" y="0"/>
+          <a:ext cx="0" cy="0"/>
+          <a:chOff x="0" y="0"/>
+          <a:chExt cx="0" cy="0"/>
+        </a:xfrm>
+      </p:grpSpPr>
+      <p:sp>
+        <p:nvSpPr>
+          <p:cNvPr id="2" name="Title 1">
+            <a:extLst>
+              <a:ext uri="{FF2B5EF4-FFF2-40B4-BE49-F238E27FC236}">
+                <a16:creationId xmlns:a16="http://schemas.microsoft.com/office/drawing/2014/main" id="{467723AB-97DC-795F-1AEB-162771DC8B02}"/>
+              </a:ext>
+            </a:extLst>
+          </p:cNvPr>
+          <p:cNvSpPr>
+            <a:spLocks noGrp="1"/>
+          </p:cNvSpPr>
+          <p:nvPr>
+            <p:ph type="title"/>
+          </p:nvPr>
+        </p:nvSpPr>
+        <p:spPr/>
+        <p:txBody>
+          <a:bodyPr>
+            <a:normAutofit fontScale="90000"/>
+          </a:bodyPr>
+          <a:lstStyle/>
+          <a:p>
+            <a:r>
+              <a:rPr lang="es-UY" dirty="0"/>
+              <a:t>¿Terminan? ¿Qué tienen en común?</a:t>
+            </a:r>
+            <a:endParaRPr lang="en-US" dirty="0"/>
+          </a:p>
+        </p:txBody>
+      </p:sp>
+      <p:sp>
+        <p:nvSpPr>
+          <p:cNvPr id="3" name="Content Placeholder 2">
+            <a:extLst>
+              <a:ext uri="{FF2B5EF4-FFF2-40B4-BE49-F238E27FC236}">
+                <a16:creationId xmlns:a16="http://schemas.microsoft.com/office/drawing/2014/main" id="{EBCE5095-D77F-7C2C-8B92-3943BB42CF8B}"/>
+              </a:ext>
+            </a:extLst>
+          </p:cNvPr>
+          <p:cNvSpPr>
+            <a:spLocks noGrp="1"/>
+          </p:cNvSpPr>
+          <p:nvPr>
+            <p:ph idx="1"/>
+          </p:nvPr>
+        </p:nvSpPr>
+        <p:spPr/>
+        <p:txBody>
+          <a:bodyPr numCol="2">
+            <a:normAutofit/>
+          </a:bodyPr>
+          <a:lstStyle/>
+          <a:p>
+            <a:pPr marL="0" indent="0">
+              <a:buNone/>
+            </a:pPr>
+            <a:r>
+              <a:rPr lang="en-US" sz="2400" dirty="0"/>
+              <a:t>int </a:t>
+            </a:r>
+            <a:r>
+              <a:rPr lang="en-US" sz="2400" b="1" dirty="0" err="1"/>
+              <a:t>suma</a:t>
+            </a:r>
+            <a:r>
+              <a:rPr lang="en-US" sz="2400" dirty="0"/>
+              <a:t>(int a, int b) {</a:t>
+            </a:r>
+          </a:p>
+          <a:p>
+            <a:pPr marL="0" indent="0">
+              <a:buNone/>
+            </a:pPr>
+            <a:r>
+              <a:rPr lang="en-US" sz="2400" dirty="0"/>
+              <a:t>    if (b == 0)</a:t>
+            </a:r>
+          </a:p>
+          <a:p>
+            <a:pPr marL="0" indent="0">
+              <a:buNone/>
+            </a:pPr>
+            <a:r>
+              <a:rPr lang="en-US" sz="2400" dirty="0"/>
+              <a:t>        return a;</a:t>
+            </a:r>
+          </a:p>
+          <a:p>
+            <a:pPr marL="0" indent="0">
+              <a:buNone/>
+            </a:pPr>
+            <a:r>
+              <a:rPr lang="en-US" sz="2400" dirty="0"/>
+              <a:t>    else</a:t>
+            </a:r>
+          </a:p>
+          <a:p>
+            <a:pPr marL="0" indent="0">
+              <a:buNone/>
+            </a:pPr>
+            <a:r>
+              <a:rPr lang="en-US" sz="2400" dirty="0"/>
+              <a:t>        return </a:t>
+            </a:r>
+            <a:r>
+              <a:rPr lang="en-US" sz="2400" dirty="0" err="1"/>
+              <a:t>suma</a:t>
+            </a:r>
+            <a:r>
+              <a:rPr lang="en-US" sz="2400" dirty="0"/>
+              <a:t>(a, b - 1) + 1;}</a:t>
+            </a:r>
+          </a:p>
+          <a:p>
+            <a:pPr marL="0" indent="0">
+              <a:buNone/>
+            </a:pPr>
+            <a:endParaRPr lang="en-US" sz="2400" dirty="0"/>
+          </a:p>
+          <a:p>
+            <a:pPr marL="0" indent="0">
+              <a:buNone/>
+            </a:pPr>
+            <a:r>
+              <a:rPr lang="en-US" sz="2400" dirty="0"/>
+              <a:t>int </a:t>
+            </a:r>
+            <a:r>
+              <a:rPr lang="en-US" sz="2400" b="1" dirty="0" err="1"/>
+              <a:t>minimo</a:t>
+            </a:r>
+            <a:r>
+              <a:rPr lang="en-US" sz="2400" dirty="0"/>
+              <a:t>(int a, int b) {</a:t>
+            </a:r>
+          </a:p>
+          <a:p>
+            <a:pPr marL="0" indent="0">
+              <a:buNone/>
+            </a:pPr>
+            <a:r>
+              <a:rPr lang="en-US" sz="2400" dirty="0"/>
+              <a:t>    if (a == 0 || b == 0) return 0;</a:t>
+            </a:r>
+          </a:p>
+          <a:p>
+            <a:pPr marL="0" indent="0">
+              <a:buNone/>
+            </a:pPr>
+            <a:r>
+              <a:rPr lang="en-US" sz="2400" dirty="0"/>
+              <a:t>    else return 1 + </a:t>
+            </a:r>
+            <a:r>
+              <a:rPr lang="en-US" sz="2400" dirty="0" err="1"/>
+              <a:t>minimo</a:t>
+            </a:r>
+            <a:r>
+              <a:rPr lang="en-US" sz="2400" dirty="0"/>
+              <a:t>(a - 1, b - 1);}</a:t>
+            </a:r>
+          </a:p>
+          <a:p>
+            <a:pPr marL="0" indent="0">
+              <a:buNone/>
+            </a:pPr>
+            <a:r>
+              <a:rPr lang="en-US" sz="2400" dirty="0"/>
+              <a:t>int </a:t>
+            </a:r>
+            <a:r>
+              <a:rPr lang="en-US" sz="2400" b="1" dirty="0"/>
+              <a:t>factorial</a:t>
+            </a:r>
+            <a:r>
+              <a:rPr lang="en-US" sz="2400" dirty="0"/>
+              <a:t>(int n) {</a:t>
+            </a:r>
+          </a:p>
+          <a:p>
+            <a:pPr marL="0" indent="0">
+              <a:buNone/>
+            </a:pPr>
+            <a:r>
+              <a:rPr lang="en-US" sz="2400" dirty="0"/>
+              <a:t>    if (n == 0)</a:t>
+            </a:r>
+          </a:p>
+          <a:p>
+            <a:pPr marL="0" indent="0">
+              <a:buNone/>
+            </a:pPr>
+            <a:r>
+              <a:rPr lang="en-US" sz="2400" dirty="0"/>
+              <a:t>        return 1;</a:t>
+            </a:r>
+          </a:p>
+          <a:p>
+            <a:pPr marL="0" indent="0">
+              <a:buNone/>
+            </a:pPr>
+            <a:r>
+              <a:rPr lang="en-US" sz="2400" dirty="0"/>
+              <a:t>    else</a:t>
+            </a:r>
+          </a:p>
+          <a:p>
+            <a:pPr marL="0" indent="0">
+              <a:buNone/>
+            </a:pPr>
+            <a:r>
+              <a:rPr lang="en-US" sz="2400" dirty="0"/>
+              <a:t>        return </a:t>
+            </a:r>
+            <a:r>
+              <a:rPr lang="en-US" sz="2400" dirty="0" err="1"/>
+              <a:t>multiplicacion</a:t>
+            </a:r>
+            <a:r>
+              <a:rPr lang="en-US" sz="2400" dirty="0"/>
+              <a:t>(n, factorial(n - 1));}</a:t>
+            </a:r>
+          </a:p>
+          <a:p>
+            <a:pPr marL="0" indent="0">
+              <a:buNone/>
+            </a:pPr>
+            <a:endParaRPr lang="en-US" sz="2400" dirty="0"/>
+          </a:p>
+        </p:txBody>
+      </p:sp>
+    </p:spTree>
+    <p:extLst>
+      <p:ext uri="{BB962C8B-B14F-4D97-AF65-F5344CB8AC3E}">
+        <p14:creationId xmlns:p14="http://schemas.microsoft.com/office/powerpoint/2010/main" val="2374071135"/>
+      </p:ext>
+    </p:extLst>
+  </p:cSld>
+  <p:clrMapOvr>
+    <a:masterClrMapping/>
+  </p:clrMapOvr>
+</p:sld>
+</file>
+
+<file path=ppt/slides/slide18.xml><?xml version="1.0" encoding="utf-8"?>
 <p:sld xmlns:a="http://schemas.openxmlformats.org/drawingml/2006/main" xmlns:r="http://schemas.openxmlformats.org/officeDocument/2006/relationships" xmlns:p="http://schemas.openxmlformats.org/presentationml/2006/main">
   <p:cSld>
     <p:bg>
@@ -3374,7 +4756,7 @@
 </p:sld>
 </file>
 
-<file path=ppt/slides/slide11.xml><?xml version="1.0" encoding="utf-8"?>
+<file path=ppt/slides/slide19.xml><?xml version="1.0" encoding="utf-8"?>
 <p:sld xmlns:a="http://schemas.openxmlformats.org/drawingml/2006/main" xmlns:r="http://schemas.openxmlformats.org/officeDocument/2006/relationships" xmlns:p="http://schemas.openxmlformats.org/presentationml/2006/main">
   <p:cSld>
     <p:bg>
@@ -3444,7 +4826,119 @@
 </p:sld>
 </file>
 
-<file path=ppt/slides/slide12.xml><?xml version="1.0" encoding="utf-8"?>
+<file path=ppt/slides/slide2.xml><?xml version="1.0" encoding="utf-8"?>
+<p:sld xmlns:a="http://schemas.openxmlformats.org/drawingml/2006/main" xmlns:r="http://schemas.openxmlformats.org/officeDocument/2006/relationships" xmlns:p="http://schemas.openxmlformats.org/presentationml/2006/main">
+  <p:cSld>
+    <p:spTree>
+      <p:nvGrpSpPr>
+        <p:cNvPr id="1" name=""/>
+        <p:cNvGrpSpPr/>
+        <p:nvPr/>
+      </p:nvGrpSpPr>
+      <p:grpSpPr>
+        <a:xfrm>
+          <a:off x="0" y="0"/>
+          <a:ext cx="0" cy="0"/>
+          <a:chOff x="0" y="0"/>
+          <a:chExt cx="0" cy="0"/>
+        </a:xfrm>
+      </p:grpSpPr>
+      <p:sp>
+        <p:nvSpPr>
+          <p:cNvPr id="2" name="Title 1">
+            <a:extLst>
+              <a:ext uri="{FF2B5EF4-FFF2-40B4-BE49-F238E27FC236}">
+                <a16:creationId xmlns:a16="http://schemas.microsoft.com/office/drawing/2014/main" id="{90C7E906-81AC-3447-838D-DBD178F8FA9E}"/>
+              </a:ext>
+            </a:extLst>
+          </p:cNvPr>
+          <p:cNvSpPr>
+            <a:spLocks noGrp="1"/>
+          </p:cNvSpPr>
+          <p:nvPr>
+            <p:ph type="title"/>
+          </p:nvPr>
+        </p:nvSpPr>
+        <p:spPr/>
+        <p:txBody>
+          <a:bodyPr/>
+          <a:lstStyle/>
+          <a:p>
+            <a:r>
+              <a:rPr lang="es-UY" dirty="0"/>
+              <a:t>Presentación</a:t>
+            </a:r>
+            <a:endParaRPr lang="en-US" dirty="0"/>
+          </a:p>
+        </p:txBody>
+      </p:sp>
+      <p:sp>
+        <p:nvSpPr>
+          <p:cNvPr id="3" name="Content Placeholder 2">
+            <a:extLst>
+              <a:ext uri="{FF2B5EF4-FFF2-40B4-BE49-F238E27FC236}">
+                <a16:creationId xmlns:a16="http://schemas.microsoft.com/office/drawing/2014/main" id="{C51C0E69-D152-0CD1-3EF6-01B213654224}"/>
+              </a:ext>
+            </a:extLst>
+          </p:cNvPr>
+          <p:cNvSpPr>
+            <a:spLocks noGrp="1"/>
+          </p:cNvSpPr>
+          <p:nvPr>
+            <p:ph idx="1"/>
+          </p:nvPr>
+        </p:nvSpPr>
+        <p:spPr/>
+        <p:txBody>
+          <a:bodyPr/>
+          <a:lstStyle/>
+          <a:p>
+            <a:pPr>
+              <a:buFontTx/>
+              <a:buChar char="-"/>
+            </a:pPr>
+            <a:r>
+              <a:rPr lang="es-UY" dirty="0"/>
+              <a:t>Equipo docente</a:t>
+            </a:r>
+          </a:p>
+          <a:p>
+            <a:pPr>
+              <a:buFontTx/>
+              <a:buChar char="-"/>
+            </a:pPr>
+            <a:r>
+              <a:rPr lang="es-UY" dirty="0"/>
+              <a:t>Horarios</a:t>
+            </a:r>
+          </a:p>
+          <a:p>
+            <a:pPr>
+              <a:buFontTx/>
+              <a:buChar char="-"/>
+            </a:pPr>
+            <a:r>
+              <a:rPr lang="es-UY" dirty="0"/>
+              <a:t>Modalidad</a:t>
+            </a:r>
+            <a:endParaRPr lang="en-US" dirty="0"/>
+          </a:p>
+        </p:txBody>
+      </p:sp>
+    </p:spTree>
+    <p:extLst>
+      <p:ext uri="{BB962C8B-B14F-4D97-AF65-F5344CB8AC3E}">
+        <p14:creationId xmlns:p14="http://schemas.microsoft.com/office/powerpoint/2010/main" val="2337030794"/>
+      </p:ext>
+    </p:extLst>
+  </p:cSld>
+  <p:clrMapOvr>
+    <a:masterClrMapping/>
+  </p:clrMapOvr>
+</p:sld>
+</file>
+
+<file path=ppt/slides/slide20.xml><?xml version="1.0" encoding="utf-8"?>
 <p:sld xmlns:a="http://schemas.openxmlformats.org/drawingml/2006/main" xmlns:r="http://schemas.openxmlformats.org/officeDocument/2006/relationships" xmlns:p="http://schemas.openxmlformats.org/presentationml/2006/main">
   <p:cSld>
     <p:bg>
@@ -3786,7 +5280,7 @@
 </p:sld>
 </file>
 
-<file path=ppt/slides/slide13.xml><?xml version="1.0" encoding="utf-8"?>
+<file path=ppt/slides/slide21.xml><?xml version="1.0" encoding="utf-8"?>
 <p:sld xmlns:a="http://schemas.openxmlformats.org/drawingml/2006/main" xmlns:r="http://schemas.openxmlformats.org/officeDocument/2006/relationships" xmlns:p="http://schemas.openxmlformats.org/presentationml/2006/main">
   <p:cSld>
     <p:bg>
@@ -3951,8 +5445,8 @@
           </a:p>
         </p:txBody>
       </p:sp>
-      <mc:AlternateContent xmlns:mc="http://schemas.openxmlformats.org/markup-compatibility/2006">
-        <mc:Choice xmlns:a14="http://schemas.microsoft.com/office/drawing/2010/main" Requires="a14">
+      <mc:AlternateContent xmlns:mc="http://schemas.openxmlformats.org/markup-compatibility/2006" xmlns:a14="http://schemas.microsoft.com/office/drawing/2010/main">
+        <mc:Choice Requires="a14">
           <p:sp>
             <p:nvSpPr>
               <p:cNvPr id="4" name="Content Placeholder 3">
@@ -4162,7 +5656,7 @@
             </p:txBody>
           </p:sp>
         </mc:Choice>
-        <mc:Fallback>
+        <mc:Fallback xmlns="">
           <p:sp>
             <p:nvSpPr>
               <p:cNvPr id="4" name="Content Placeholder 3">
@@ -4215,7 +5709,7 @@
 </p:sld>
 </file>
 
-<file path=ppt/slides/slide14.xml><?xml version="1.0" encoding="utf-8"?>
+<file path=ppt/slides/slide22.xml><?xml version="1.0" encoding="utf-8"?>
 <p:sld xmlns:a="http://schemas.openxmlformats.org/drawingml/2006/main" xmlns:r="http://schemas.openxmlformats.org/officeDocument/2006/relationships" xmlns:p="http://schemas.openxmlformats.org/presentationml/2006/main">
   <p:cSld>
     <p:bg>
@@ -4947,7 +6441,7 @@
 </p:sld>
 </file>
 
-<file path=ppt/slides/slide15.xml><?xml version="1.0" encoding="utf-8"?>
+<file path=ppt/slides/slide23.xml><?xml version="1.0" encoding="utf-8"?>
 <p:sld xmlns:a="http://schemas.openxmlformats.org/drawingml/2006/main" xmlns:r="http://schemas.openxmlformats.org/officeDocument/2006/relationships" xmlns:p="http://schemas.openxmlformats.org/presentationml/2006/main">
   <p:cSld>
     <p:spTree>
@@ -5312,7 +6806,7 @@
 </p:sld>
 </file>
 
-<file path=ppt/slides/slide16.xml><?xml version="1.0" encoding="utf-8"?>
+<file path=ppt/slides/slide24.xml><?xml version="1.0" encoding="utf-8"?>
 <p:sld xmlns:a="http://schemas.openxmlformats.org/drawingml/2006/main" xmlns:r="http://schemas.openxmlformats.org/officeDocument/2006/relationships" xmlns:p="http://schemas.openxmlformats.org/presentationml/2006/main">
   <p:cSld>
     <p:spTree>
@@ -5426,7 +6920,7 @@
 </p:sld>
 </file>
 
-<file path=ppt/slides/slide17.xml><?xml version="1.0" encoding="utf-8"?>
+<file path=ppt/slides/slide25.xml><?xml version="1.0" encoding="utf-8"?>
 <p:sld xmlns:a="http://schemas.openxmlformats.org/drawingml/2006/main" xmlns:r="http://schemas.openxmlformats.org/officeDocument/2006/relationships" xmlns:p="http://schemas.openxmlformats.org/presentationml/2006/main">
   <p:cSld>
     <p:spTree>
@@ -5560,7 +7054,7 @@
 </p:sld>
 </file>
 
-<file path=ppt/slides/slide18.xml><?xml version="1.0" encoding="utf-8"?>
+<file path=ppt/slides/slide26.xml><?xml version="1.0" encoding="utf-8"?>
 <p:sld xmlns:a="http://schemas.openxmlformats.org/drawingml/2006/main" xmlns:r="http://schemas.openxmlformats.org/officeDocument/2006/relationships" xmlns:p="http://schemas.openxmlformats.org/presentationml/2006/main">
   <p:cSld>
     <p:spTree>
@@ -5732,7 +7226,7 @@
 </p:sld>
 </file>
 
-<file path=ppt/slides/slide19.xml><?xml version="1.0" encoding="utf-8"?>
+<file path=ppt/slides/slide27.xml><?xml version="1.0" encoding="utf-8"?>
 <p:sld xmlns:a="http://schemas.openxmlformats.org/drawingml/2006/main" xmlns:r="http://schemas.openxmlformats.org/officeDocument/2006/relationships" xmlns:p="http://schemas.openxmlformats.org/presentationml/2006/main">
   <p:cSld>
     <p:spTree>
@@ -5844,94 +7338,7 @@
 </p:sld>
 </file>
 
-<file path=ppt/slides/slide2.xml><?xml version="1.0" encoding="utf-8"?>
-<p:sld xmlns:a="http://schemas.openxmlformats.org/drawingml/2006/main" xmlns:r="http://schemas.openxmlformats.org/officeDocument/2006/relationships" xmlns:p="http://schemas.openxmlformats.org/presentationml/2006/main">
-  <p:cSld>
-    <p:spTree>
-      <p:nvGrpSpPr>
-        <p:cNvPr id="1" name=""/>
-        <p:cNvGrpSpPr/>
-        <p:nvPr/>
-      </p:nvGrpSpPr>
-      <p:grpSpPr>
-        <a:xfrm>
-          <a:off x="0" y="0"/>
-          <a:ext cx="0" cy="0"/>
-          <a:chOff x="0" y="0"/>
-          <a:chExt cx="0" cy="0"/>
-        </a:xfrm>
-      </p:grpSpPr>
-      <p:sp>
-        <p:nvSpPr>
-          <p:cNvPr id="2" name="Title 1">
-            <a:extLst>
-              <a:ext uri="{FF2B5EF4-FFF2-40B4-BE49-F238E27FC236}">
-                <a16:creationId xmlns:a16="http://schemas.microsoft.com/office/drawing/2014/main" id="{E3F9DB06-DF13-4D92-7DC4-2B3B9132CCE2}"/>
-              </a:ext>
-            </a:extLst>
-          </p:cNvPr>
-          <p:cNvSpPr>
-            <a:spLocks noGrp="1"/>
-          </p:cNvSpPr>
-          <p:nvPr>
-            <p:ph type="title"/>
-          </p:nvPr>
-        </p:nvSpPr>
-        <p:spPr/>
-        <p:txBody>
-          <a:bodyPr/>
-          <a:lstStyle/>
-          <a:p>
-            <a:r>
-              <a:rPr lang="es-UY" dirty="0"/>
-              <a:t>Bibliografía</a:t>
-            </a:r>
-            <a:endParaRPr lang="en-US" dirty="0"/>
-          </a:p>
-        </p:txBody>
-      </p:sp>
-      <p:sp>
-        <p:nvSpPr>
-          <p:cNvPr id="3" name="Content Placeholder 2">
-            <a:extLst>
-              <a:ext uri="{FF2B5EF4-FFF2-40B4-BE49-F238E27FC236}">
-                <a16:creationId xmlns:a16="http://schemas.microsoft.com/office/drawing/2014/main" id="{3F0FB1CD-EA68-9F94-8587-3C278CCA2A12}"/>
-              </a:ext>
-            </a:extLst>
-          </p:cNvPr>
-          <p:cNvSpPr>
-            <a:spLocks noGrp="1"/>
-          </p:cNvSpPr>
-          <p:nvPr>
-            <p:ph idx="1"/>
-          </p:nvPr>
-        </p:nvSpPr>
-        <p:spPr/>
-        <p:txBody>
-          <a:bodyPr/>
-          <a:lstStyle/>
-          <a:p>
-            <a:r>
-              <a:rPr lang="en-US" dirty="0"/>
-              <a:t>https://cs.uns.edu.ar/materias/tc2do/downloads/Apuntes/Funciones%20Recursivas-TdC2019.pdf</a:t>
-            </a:r>
-          </a:p>
-        </p:txBody>
-      </p:sp>
-    </p:spTree>
-    <p:extLst>
-      <p:ext uri="{BB962C8B-B14F-4D97-AF65-F5344CB8AC3E}">
-        <p14:creationId xmlns:p14="http://schemas.microsoft.com/office/powerpoint/2010/main" val="1241529128"/>
-      </p:ext>
-    </p:extLst>
-  </p:cSld>
-  <p:clrMapOvr>
-    <a:masterClrMapping/>
-  </p:clrMapOvr>
-</p:sld>
-</file>
-
-<file path=ppt/slides/slide20.xml><?xml version="1.0" encoding="utf-8"?>
+<file path=ppt/slides/slide28.xml><?xml version="1.0" encoding="utf-8"?>
 <p:sld xmlns:a="http://schemas.openxmlformats.org/drawingml/2006/main" xmlns:r="http://schemas.openxmlformats.org/officeDocument/2006/relationships" xmlns:p="http://schemas.openxmlformats.org/presentationml/2006/main">
   <p:cSld>
     <p:spTree>
@@ -6048,7 +7455,208 @@
 </p:sld>
 </file>
 
-<file path=ppt/slides/slide21.xml><?xml version="1.0" encoding="utf-8"?>
+<file path=ppt/slides/slide29.xml><?xml version="1.0" encoding="utf-8"?>
+<p:sld xmlns:a="http://schemas.openxmlformats.org/drawingml/2006/main" xmlns:r="http://schemas.openxmlformats.org/officeDocument/2006/relationships" xmlns:p="http://schemas.openxmlformats.org/presentationml/2006/main">
+  <p:cSld>
+    <p:spTree>
+      <p:nvGrpSpPr>
+        <p:cNvPr id="1" name=""/>
+        <p:cNvGrpSpPr/>
+        <p:nvPr/>
+      </p:nvGrpSpPr>
+      <p:grpSpPr>
+        <a:xfrm>
+          <a:off x="0" y="0"/>
+          <a:ext cx="0" cy="0"/>
+          <a:chOff x="0" y="0"/>
+          <a:chExt cx="0" cy="0"/>
+        </a:xfrm>
+      </p:grpSpPr>
+      <p:sp>
+        <p:nvSpPr>
+          <p:cNvPr id="2" name="Title 1">
+            <a:extLst>
+              <a:ext uri="{FF2B5EF4-FFF2-40B4-BE49-F238E27FC236}">
+                <a16:creationId xmlns:a16="http://schemas.microsoft.com/office/drawing/2014/main" id="{C8B7FE59-A6FA-F03F-B6BC-62AB8FCFFF85}"/>
+              </a:ext>
+            </a:extLst>
+          </p:cNvPr>
+          <p:cNvSpPr>
+            <a:spLocks noGrp="1"/>
+          </p:cNvSpPr>
+          <p:nvPr>
+            <p:ph type="title"/>
+          </p:nvPr>
+        </p:nvSpPr>
+        <p:spPr/>
+        <p:txBody>
+          <a:bodyPr/>
+          <a:lstStyle/>
+          <a:p>
+            <a:r>
+              <a:rPr lang="es-UY" dirty="0"/>
+              <a:t>Pregunta</a:t>
+            </a:r>
+            <a:endParaRPr lang="en-US" dirty="0"/>
+          </a:p>
+        </p:txBody>
+      </p:sp>
+      <p:sp>
+        <p:nvSpPr>
+          <p:cNvPr id="3" name="Content Placeholder 2">
+            <a:extLst>
+              <a:ext uri="{FF2B5EF4-FFF2-40B4-BE49-F238E27FC236}">
+                <a16:creationId xmlns:a16="http://schemas.microsoft.com/office/drawing/2014/main" id="{39E1BAF9-C5AF-DADC-8379-5D51EACBDD74}"/>
+              </a:ext>
+            </a:extLst>
+          </p:cNvPr>
+          <p:cNvSpPr>
+            <a:spLocks noGrp="1"/>
+          </p:cNvSpPr>
+          <p:nvPr>
+            <p:ph idx="1"/>
+          </p:nvPr>
+        </p:nvSpPr>
+        <p:spPr/>
+        <p:txBody>
+          <a:bodyPr>
+            <a:normAutofit/>
+          </a:bodyPr>
+          <a:lstStyle/>
+          <a:p>
+            <a:pPr marL="0" indent="0">
+              <a:buNone/>
+            </a:pPr>
+            <a:r>
+              <a:rPr lang="es-ES" dirty="0"/>
+              <a:t>El mismo jefe te encarga una solución al problema del viajante: Escribir un programa que reciba un conjunto de puntos a visitar y los costos de conexión entre cada una de las parejas de puntos y determine un itinerario de costo mínimo. Dice también que sabe que la solución inmediata puede llegar a ser algo costosa en tiempo de ejecución, por lo que deberías estudiar alternativas. ¿Cuál sería tu respuesta?</a:t>
+            </a:r>
+            <a:endParaRPr lang="en-US" dirty="0"/>
+          </a:p>
+        </p:txBody>
+      </p:sp>
+    </p:spTree>
+    <p:extLst>
+      <p:ext uri="{BB962C8B-B14F-4D97-AF65-F5344CB8AC3E}">
+        <p14:creationId xmlns:p14="http://schemas.microsoft.com/office/powerpoint/2010/main" val="621401291"/>
+      </p:ext>
+    </p:extLst>
+  </p:cSld>
+  <p:clrMapOvr>
+    <a:masterClrMapping/>
+  </p:clrMapOvr>
+</p:sld>
+</file>
+
+<file path=ppt/slides/slide3.xml><?xml version="1.0" encoding="utf-8"?>
+<p:sld xmlns:a="http://schemas.openxmlformats.org/drawingml/2006/main" xmlns:r="http://schemas.openxmlformats.org/officeDocument/2006/relationships" xmlns:p="http://schemas.openxmlformats.org/presentationml/2006/main">
+  <p:cSld>
+    <p:spTree>
+      <p:nvGrpSpPr>
+        <p:cNvPr id="1" name=""/>
+        <p:cNvGrpSpPr/>
+        <p:nvPr/>
+      </p:nvGrpSpPr>
+      <p:grpSpPr>
+        <a:xfrm>
+          <a:off x="0" y="0"/>
+          <a:ext cx="0" cy="0"/>
+          <a:chOff x="0" y="0"/>
+          <a:chExt cx="0" cy="0"/>
+        </a:xfrm>
+      </p:grpSpPr>
+      <p:sp>
+        <p:nvSpPr>
+          <p:cNvPr id="2" name="Title 1">
+            <a:extLst>
+              <a:ext uri="{FF2B5EF4-FFF2-40B4-BE49-F238E27FC236}">
+                <a16:creationId xmlns:a16="http://schemas.microsoft.com/office/drawing/2014/main" id="{28EBDF79-9A04-EEFE-8F25-2B2437C80B7A}"/>
+              </a:ext>
+            </a:extLst>
+          </p:cNvPr>
+          <p:cNvSpPr>
+            <a:spLocks noGrp="1"/>
+          </p:cNvSpPr>
+          <p:nvPr>
+            <p:ph type="title"/>
+          </p:nvPr>
+        </p:nvSpPr>
+        <p:spPr/>
+        <p:txBody>
+          <a:bodyPr/>
+          <a:lstStyle/>
+          <a:p>
+            <a:r>
+              <a:rPr lang="es-UY" dirty="0"/>
+              <a:t>Evaluaciones</a:t>
+            </a:r>
+            <a:endParaRPr lang="en-US" dirty="0"/>
+          </a:p>
+        </p:txBody>
+      </p:sp>
+      <p:pic>
+        <p:nvPicPr>
+          <p:cNvPr id="1026" name="Picture 2">
+            <a:extLst>
+              <a:ext uri="{FF2B5EF4-FFF2-40B4-BE49-F238E27FC236}">
+                <a16:creationId xmlns:a16="http://schemas.microsoft.com/office/drawing/2014/main" id="{24F7F245-7259-AC78-B723-3DBC950D794F}"/>
+              </a:ext>
+            </a:extLst>
+          </p:cNvPr>
+          <p:cNvPicPr>
+            <a:picLocks noGrp="1" noChangeAspect="1" noChangeArrowheads="1"/>
+          </p:cNvPicPr>
+          <p:nvPr>
+            <p:ph idx="1"/>
+          </p:nvPr>
+        </p:nvPicPr>
+        <p:blipFill>
+          <a:blip r:embed="rId2">
+            <a:extLst>
+              <a:ext uri="{28A0092B-C50C-407E-A947-70E740481C1C}">
+                <a14:useLocalDpi xmlns:a14="http://schemas.microsoft.com/office/drawing/2010/main" val="0"/>
+              </a:ext>
+            </a:extLst>
+          </a:blip>
+          <a:srcRect/>
+          <a:stretch>
+            <a:fillRect/>
+          </a:stretch>
+        </p:blipFill>
+        <p:spPr bwMode="auto">
+          <a:xfrm>
+            <a:off x="776276" y="1600200"/>
+            <a:ext cx="7591447" cy="4525963"/>
+          </a:xfrm>
+          <a:prstGeom prst="rect">
+            <a:avLst/>
+          </a:prstGeom>
+          <a:noFill/>
+          <a:extLst>
+            <a:ext uri="{909E8E84-426E-40DD-AFC4-6F175D3DCCD1}">
+              <a14:hiddenFill xmlns:a14="http://schemas.microsoft.com/office/drawing/2010/main">
+                <a:solidFill>
+                  <a:srgbClr val="FFFFFF"/>
+                </a:solidFill>
+              </a14:hiddenFill>
+            </a:ext>
+          </a:extLst>
+        </p:spPr>
+      </p:pic>
+    </p:spTree>
+    <p:extLst>
+      <p:ext uri="{BB962C8B-B14F-4D97-AF65-F5344CB8AC3E}">
+        <p14:creationId xmlns:p14="http://schemas.microsoft.com/office/powerpoint/2010/main" val="426719012"/>
+      </p:ext>
+    </p:extLst>
+  </p:cSld>
+  <p:clrMapOvr>
+    <a:masterClrMapping/>
+  </p:clrMapOvr>
+</p:sld>
+</file>
+
+<file path=ppt/slides/slide30.xml><?xml version="1.0" encoding="utf-8"?>
 <p:sld xmlns:a="http://schemas.openxmlformats.org/drawingml/2006/main" xmlns:r="http://schemas.openxmlformats.org/officeDocument/2006/relationships" xmlns:p="http://schemas.openxmlformats.org/presentationml/2006/main">
   <p:cSld>
     <p:spTree>
@@ -6152,7 +7760,7 @@
 </p:sld>
 </file>
 
-<file path=ppt/slides/slide22.xml><?xml version="1.0" encoding="utf-8"?>
+<file path=ppt/slides/slide31.xml><?xml version="1.0" encoding="utf-8"?>
 <p:sld xmlns:a="http://schemas.openxmlformats.org/drawingml/2006/main" xmlns:r="http://schemas.openxmlformats.org/officeDocument/2006/relationships" xmlns:p="http://schemas.openxmlformats.org/presentationml/2006/main">
   <p:cSld>
     <p:spTree>
@@ -6228,7 +7836,7 @@
 </p:sld>
 </file>
 
-<file path=ppt/slides/slide23.xml><?xml version="1.0" encoding="utf-8"?>
+<file path=ppt/slides/slide32.xml><?xml version="1.0" encoding="utf-8"?>
 <p:sld xmlns:a="http://schemas.openxmlformats.org/drawingml/2006/main" xmlns:r="http://schemas.openxmlformats.org/officeDocument/2006/relationships" xmlns:p="http://schemas.openxmlformats.org/presentationml/2006/main">
   <p:cSld>
     <p:spTree>
@@ -6313,7 +7921,7 @@
 </p:sld>
 </file>
 
-<file path=ppt/slides/slide24.xml><?xml version="1.0" encoding="utf-8"?>
+<file path=ppt/slides/slide33.xml><?xml version="1.0" encoding="utf-8"?>
 <p:sld xmlns:a="http://schemas.openxmlformats.org/drawingml/2006/main" xmlns:r="http://schemas.openxmlformats.org/officeDocument/2006/relationships" xmlns:p="http://schemas.openxmlformats.org/presentationml/2006/main">
   <p:cSld>
     <p:spTree>
@@ -6428,7 +8036,7 @@
 </p:sld>
 </file>
 
-<file path=ppt/slides/slide25.xml><?xml version="1.0" encoding="utf-8"?>
+<file path=ppt/slides/slide34.xml><?xml version="1.0" encoding="utf-8"?>
 <p:sld xmlns:a="http://schemas.openxmlformats.org/drawingml/2006/main" xmlns:r="http://schemas.openxmlformats.org/officeDocument/2006/relationships" xmlns:p="http://schemas.openxmlformats.org/presentationml/2006/main">
   <p:cSld>
     <p:spTree>
@@ -6517,7 +8125,7 @@
 </p:sld>
 </file>
 
-<file path=ppt/slides/slide26.xml><?xml version="1.0" encoding="utf-8"?>
+<file path=ppt/slides/slide35.xml><?xml version="1.0" encoding="utf-8"?>
 <p:sld xmlns:a="http://schemas.openxmlformats.org/drawingml/2006/main" xmlns:r="http://schemas.openxmlformats.org/officeDocument/2006/relationships" xmlns:p="http://schemas.openxmlformats.org/presentationml/2006/main">
   <p:cSld>
     <p:spTree>
@@ -6603,7 +8211,7 @@
 </p:sld>
 </file>
 
-<file path=ppt/slides/slide27.xml><?xml version="1.0" encoding="utf-8"?>
+<file path=ppt/slides/slide36.xml><?xml version="1.0" encoding="utf-8"?>
 <p:sld xmlns:a="http://schemas.openxmlformats.org/drawingml/2006/main" xmlns:r="http://schemas.openxmlformats.org/officeDocument/2006/relationships" xmlns:p="http://schemas.openxmlformats.org/presentationml/2006/main">
   <p:cSld>
     <p:spTree>
@@ -6697,7 +8305,7 @@
 </p:sld>
 </file>
 
-<file path=ppt/slides/slide28.xml><?xml version="1.0" encoding="utf-8"?>
+<file path=ppt/slides/slide37.xml><?xml version="1.0" encoding="utf-8"?>
 <p:sld xmlns:a="http://schemas.openxmlformats.org/drawingml/2006/main" xmlns:r="http://schemas.openxmlformats.org/officeDocument/2006/relationships" xmlns:p="http://schemas.openxmlformats.org/presentationml/2006/main">
   <p:cSld>
     <p:spTree>
@@ -6786,7 +8394,7 @@
 </p:sld>
 </file>
 
-<file path=ppt/slides/slide29.xml><?xml version="1.0" encoding="utf-8"?>
+<file path=ppt/slides/slide38.xml><?xml version="1.0" encoding="utf-8"?>
 <p:sld xmlns:a="http://schemas.openxmlformats.org/drawingml/2006/main" xmlns:r="http://schemas.openxmlformats.org/officeDocument/2006/relationships" xmlns:p="http://schemas.openxmlformats.org/presentationml/2006/main">
   <p:cSld>
     <p:spTree>
@@ -6875,166 +8483,7 @@
 </p:sld>
 </file>
 
-<file path=ppt/slides/slide3.xml><?xml version="1.0" encoding="utf-8"?>
-<p:sld xmlns:a="http://schemas.openxmlformats.org/drawingml/2006/main" xmlns:r="http://schemas.openxmlformats.org/officeDocument/2006/relationships" xmlns:p="http://schemas.openxmlformats.org/presentationml/2006/main">
-  <p:cSld>
-    <p:spTree>
-      <p:nvGrpSpPr>
-        <p:cNvPr id="1" name=""/>
-        <p:cNvGrpSpPr/>
-        <p:nvPr/>
-      </p:nvGrpSpPr>
-      <p:grpSpPr>
-        <a:xfrm>
-          <a:off x="0" y="0"/>
-          <a:ext cx="0" cy="0"/>
-          <a:chOff x="0" y="0"/>
-          <a:chExt cx="0" cy="0"/>
-        </a:xfrm>
-      </p:grpSpPr>
-      <p:sp>
-        <p:nvSpPr>
-          <p:cNvPr id="2" name="Title 1">
-            <a:extLst>
-              <a:ext uri="{FF2B5EF4-FFF2-40B4-BE49-F238E27FC236}">
-                <a16:creationId xmlns:a16="http://schemas.microsoft.com/office/drawing/2014/main" id="{651D80C5-86D6-912C-CCBE-56A459D5ADED}"/>
-              </a:ext>
-            </a:extLst>
-          </p:cNvPr>
-          <p:cNvSpPr>
-            <a:spLocks noGrp="1"/>
-          </p:cNvSpPr>
-          <p:nvPr>
-            <p:ph type="title"/>
-          </p:nvPr>
-        </p:nvSpPr>
-        <p:spPr>
-          <a:xfrm>
-            <a:off x="457200" y="274638"/>
-            <a:ext cx="8487508" cy="1143000"/>
-          </a:xfrm>
-        </p:spPr>
-        <p:txBody>
-          <a:bodyPr>
-            <a:normAutofit fontScale="90000"/>
-          </a:bodyPr>
-          <a:lstStyle/>
-          <a:p>
-            <a:r>
-              <a:rPr lang="en-US" dirty="0" err="1"/>
-              <a:t>Ejemplo</a:t>
-            </a:r>
-            <a:r>
-              <a:rPr lang="en-US" dirty="0"/>
-              <a:t> 1: </a:t>
-            </a:r>
-            <a:r>
-              <a:rPr lang="es-UY" dirty="0"/>
-              <a:t>¿Termina para toda entrada?</a:t>
-            </a:r>
-            <a:endParaRPr lang="en-US" dirty="0"/>
-          </a:p>
-        </p:txBody>
-      </p:sp>
-      <p:sp>
-        <p:nvSpPr>
-          <p:cNvPr id="3" name="Content Placeholder 2">
-            <a:extLst>
-              <a:ext uri="{FF2B5EF4-FFF2-40B4-BE49-F238E27FC236}">
-                <a16:creationId xmlns:a16="http://schemas.microsoft.com/office/drawing/2014/main" id="{05999D3F-5F2B-693F-B2B0-5FBA6B78AA37}"/>
-              </a:ext>
-            </a:extLst>
-          </p:cNvPr>
-          <p:cNvSpPr>
-            <a:spLocks noGrp="1"/>
-          </p:cNvSpPr>
-          <p:nvPr>
-            <p:ph idx="1"/>
-          </p:nvPr>
-        </p:nvSpPr>
-        <p:spPr/>
-        <p:txBody>
-          <a:bodyPr/>
-          <a:lstStyle/>
-          <a:p>
-            <a:pPr marL="0" indent="0">
-              <a:buNone/>
-            </a:pPr>
-            <a:endParaRPr lang="es-UY" dirty="0"/>
-          </a:p>
-          <a:p>
-            <a:pPr marL="0" indent="0">
-              <a:buNone/>
-            </a:pPr>
-            <a:endParaRPr lang="es-UY" dirty="0"/>
-          </a:p>
-          <a:p>
-            <a:pPr marL="0" indent="0">
-              <a:buNone/>
-            </a:pPr>
-            <a:r>
-              <a:rPr lang="es-UY" dirty="0" err="1"/>
-              <a:t>int</a:t>
-            </a:r>
-            <a:r>
-              <a:rPr lang="es-UY" dirty="0"/>
-              <a:t> f (</a:t>
-            </a:r>
-            <a:r>
-              <a:rPr lang="es-UY" dirty="0" err="1"/>
-              <a:t>int</a:t>
-            </a:r>
-            <a:r>
-              <a:rPr lang="es-UY" dirty="0"/>
-              <a:t> x, </a:t>
-            </a:r>
-            <a:r>
-              <a:rPr lang="es-UY" dirty="0" err="1"/>
-              <a:t>int</a:t>
-            </a:r>
-            <a:r>
-              <a:rPr lang="es-UY" dirty="0"/>
-              <a:t> y) </a:t>
-            </a:r>
-            <a:r>
-              <a:rPr lang="en-US" dirty="0"/>
-              <a:t>{</a:t>
-            </a:r>
-          </a:p>
-          <a:p>
-            <a:pPr marL="0" indent="0">
-              <a:buNone/>
-            </a:pPr>
-            <a:r>
-              <a:rPr lang="en-US" dirty="0"/>
-              <a:t>	return x + y</a:t>
-            </a:r>
-          </a:p>
-          <a:p>
-            <a:pPr marL="0" indent="0">
-              <a:buNone/>
-            </a:pPr>
-            <a:r>
-              <a:rPr lang="en-US" dirty="0"/>
-              <a:t>}</a:t>
-            </a:r>
-          </a:p>
-        </p:txBody>
-      </p:sp>
-    </p:spTree>
-    <p:extLst>
-      <p:ext uri="{BB962C8B-B14F-4D97-AF65-F5344CB8AC3E}">
-        <p14:creationId xmlns:p14="http://schemas.microsoft.com/office/powerpoint/2010/main" val="2109281439"/>
-      </p:ext>
-    </p:extLst>
-  </p:cSld>
-  <p:clrMapOvr>
-    <a:masterClrMapping/>
-  </p:clrMapOvr>
-</p:sld>
-</file>
-
-<file path=ppt/slides/slide30.xml><?xml version="1.0" encoding="utf-8"?>
+<file path=ppt/slides/slide39.xml><?xml version="1.0" encoding="utf-8"?>
 <p:sld xmlns:a="http://schemas.openxmlformats.org/drawingml/2006/main" xmlns:r="http://schemas.openxmlformats.org/officeDocument/2006/relationships" xmlns:p="http://schemas.openxmlformats.org/presentationml/2006/main">
   <p:cSld>
     <p:spTree>
@@ -7149,7 +8598,165 @@
 </p:sld>
 </file>
 
-<file path=ppt/slides/slide31.xml><?xml version="1.0" encoding="utf-8"?>
+<file path=ppt/slides/slide4.xml><?xml version="1.0" encoding="utf-8"?>
+<p:sld xmlns:a="http://schemas.openxmlformats.org/drawingml/2006/main" xmlns:r="http://schemas.openxmlformats.org/officeDocument/2006/relationships" xmlns:p="http://schemas.openxmlformats.org/presentationml/2006/main">
+  <p:cSld>
+    <p:spTree>
+      <p:nvGrpSpPr>
+        <p:cNvPr id="1" name=""/>
+        <p:cNvGrpSpPr/>
+        <p:nvPr/>
+      </p:nvGrpSpPr>
+      <p:grpSpPr>
+        <a:xfrm>
+          <a:off x="0" y="0"/>
+          <a:ext cx="0" cy="0"/>
+          <a:chOff x="0" y="0"/>
+          <a:chExt cx="0" cy="0"/>
+        </a:xfrm>
+      </p:grpSpPr>
+      <p:sp>
+        <p:nvSpPr>
+          <p:cNvPr id="2" name="Title 1">
+            <a:extLst>
+              <a:ext uri="{FF2B5EF4-FFF2-40B4-BE49-F238E27FC236}">
+                <a16:creationId xmlns:a16="http://schemas.microsoft.com/office/drawing/2014/main" id="{FD1CF9DD-D4A2-7916-E3A1-1AC15F457642}"/>
+              </a:ext>
+            </a:extLst>
+          </p:cNvPr>
+          <p:cNvSpPr>
+            <a:spLocks noGrp="1"/>
+          </p:cNvSpPr>
+          <p:nvPr>
+            <p:ph type="title"/>
+          </p:nvPr>
+        </p:nvSpPr>
+        <p:spPr/>
+        <p:txBody>
+          <a:bodyPr/>
+          <a:lstStyle/>
+          <a:p>
+            <a:r>
+              <a:rPr lang="es-UY" dirty="0"/>
+              <a:t>Puntajes</a:t>
+            </a:r>
+            <a:endParaRPr lang="en-US" dirty="0"/>
+          </a:p>
+        </p:txBody>
+      </p:sp>
+      <p:sp>
+        <p:nvSpPr>
+          <p:cNvPr id="3" name="Content Placeholder 2">
+            <a:extLst>
+              <a:ext uri="{FF2B5EF4-FFF2-40B4-BE49-F238E27FC236}">
+                <a16:creationId xmlns:a16="http://schemas.microsoft.com/office/drawing/2014/main" id="{DBAA005E-807C-1D6D-A90F-D148168543DF}"/>
+              </a:ext>
+            </a:extLst>
+          </p:cNvPr>
+          <p:cNvSpPr>
+            <a:spLocks noGrp="1"/>
+          </p:cNvSpPr>
+          <p:nvPr>
+            <p:ph idx="1"/>
+          </p:nvPr>
+        </p:nvSpPr>
+        <p:spPr>
+          <a:xfrm>
+            <a:off x="457200" y="1600200"/>
+            <a:ext cx="8229600" cy="5124450"/>
+          </a:xfrm>
+        </p:spPr>
+        <p:txBody>
+          <a:bodyPr>
+            <a:normAutofit/>
+          </a:bodyPr>
+          <a:lstStyle/>
+          <a:p>
+            <a:pPr fontAlgn="base"/>
+            <a:r>
+              <a:rPr lang="es-ES" dirty="0"/>
+              <a:t>Defensas de práctico: 21 </a:t>
+            </a:r>
+            <a:r>
+              <a:rPr lang="es-ES" dirty="0" err="1"/>
+              <a:t>ptos</a:t>
+            </a:r>
+            <a:r>
+              <a:rPr lang="es-ES" dirty="0"/>
+              <a:t> (7 c/u; mejores 3 de 4)</a:t>
+            </a:r>
+          </a:p>
+          <a:p>
+            <a:pPr fontAlgn="base"/>
+            <a:r>
+              <a:rPr lang="es-ES" dirty="0"/>
+              <a:t>Actuación en clase: 5 </a:t>
+            </a:r>
+            <a:r>
+              <a:rPr lang="es-ES" dirty="0" err="1"/>
+              <a:t>ptos</a:t>
+            </a:r>
+            <a:endParaRPr lang="es-ES" dirty="0"/>
+          </a:p>
+          <a:p>
+            <a:pPr fontAlgn="base"/>
+            <a:r>
+              <a:rPr lang="es-ES" dirty="0"/>
+              <a:t>Tarea + defensa (defensa durante el parcial): 14 </a:t>
+            </a:r>
+            <a:r>
+              <a:rPr lang="es-ES" dirty="0" err="1"/>
+              <a:t>ptos</a:t>
+            </a:r>
+            <a:endParaRPr lang="es-ES" dirty="0"/>
+          </a:p>
+          <a:p>
+            <a:pPr fontAlgn="base"/>
+            <a:r>
+              <a:rPr lang="es-ES" dirty="0"/>
+              <a:t>Parcial: 60 </a:t>
+            </a:r>
+            <a:r>
+              <a:rPr lang="es-ES" dirty="0" err="1"/>
+              <a:t>ptos</a:t>
+            </a:r>
+            <a:endParaRPr lang="es-ES" dirty="0"/>
+          </a:p>
+          <a:p>
+            <a:pPr fontAlgn="base"/>
+            <a:endParaRPr lang="es-ES" dirty="0"/>
+          </a:p>
+          <a:p>
+            <a:pPr marL="0" indent="0" fontAlgn="base">
+              <a:buNone/>
+            </a:pPr>
+            <a:r>
+              <a:rPr lang="es-ES" dirty="0"/>
+              <a:t>Todas las fechas están definidas y publicadas en Aulas!</a:t>
+            </a:r>
+          </a:p>
+          <a:p>
+            <a:pPr marL="0" indent="0">
+              <a:buNone/>
+            </a:pPr>
+            <a:endParaRPr lang="en-US" dirty="0"/>
+          </a:p>
+        </p:txBody>
+      </p:sp>
+    </p:spTree>
+    <p:extLst>
+      <p:ext uri="{BB962C8B-B14F-4D97-AF65-F5344CB8AC3E}">
+        <p14:creationId xmlns:p14="http://schemas.microsoft.com/office/powerpoint/2010/main" val="1355050693"/>
+      </p:ext>
+    </p:extLst>
+  </p:cSld>
+  <p:clrMapOvr>
+    <a:masterClrMapping/>
+  </p:clrMapOvr>
+</p:sld>
+</file>
+
+<file path=ppt/slides/slide40.xml><?xml version="1.0" encoding="utf-8"?>
 <p:sld xmlns:a="http://schemas.openxmlformats.org/drawingml/2006/main" xmlns:r="http://schemas.openxmlformats.org/officeDocument/2006/relationships" xmlns:p="http://schemas.openxmlformats.org/presentationml/2006/main">
   <p:cSld>
     <p:spTree>
@@ -7209,18 +8816,12 @@
 </p:sld>
 </file>
 
-<file path=ppt/slides/slide4.xml><?xml version="1.0" encoding="utf-8"?>
+<file path=ppt/slides/slide5.xml><?xml version="1.0" encoding="utf-8"?>
 <p:sld xmlns:a="http://schemas.openxmlformats.org/drawingml/2006/main" xmlns:r="http://schemas.openxmlformats.org/officeDocument/2006/relationships" xmlns:p="http://schemas.openxmlformats.org/presentationml/2006/main">
   <p:cSld>
     <p:spTree>
       <p:nvGrpSpPr>
-        <p:cNvPr id="1" name="">
-          <a:extLst>
-            <a:ext uri="{FF2B5EF4-FFF2-40B4-BE49-F238E27FC236}">
-              <a16:creationId xmlns:a16="http://schemas.microsoft.com/office/drawing/2014/main" id="{F50226EE-4998-59AB-AD49-83A89FFF15E4}"/>
-            </a:ext>
-          </a:extLst>
-        </p:cNvPr>
+        <p:cNvPr id="1" name=""/>
         <p:cNvGrpSpPr/>
         <p:nvPr/>
       </p:nvGrpSpPr>
@@ -7237,7 +8838,7 @@
           <p:cNvPr id="2" name="Title 1">
             <a:extLst>
               <a:ext uri="{FF2B5EF4-FFF2-40B4-BE49-F238E27FC236}">
-                <a16:creationId xmlns:a16="http://schemas.microsoft.com/office/drawing/2014/main" id="{4D2686E0-52D0-2730-BADC-53E4B8F65646}"/>
+                <a16:creationId xmlns:a16="http://schemas.microsoft.com/office/drawing/2014/main" id="{74CA5566-8115-7060-AD4A-7525CFA958B5}"/>
               </a:ext>
             </a:extLst>
           </p:cNvPr>
@@ -7245,32 +8846,25 @@
             <a:spLocks noGrp="1"/>
           </p:cNvSpPr>
           <p:nvPr>
-            <p:ph type="title"/>
-          </p:nvPr>
-        </p:nvSpPr>
-        <p:spPr>
-          <a:xfrm>
-            <a:off x="457200" y="274638"/>
-            <a:ext cx="8487508" cy="1143000"/>
-          </a:xfrm>
-        </p:spPr>
-        <p:txBody>
-          <a:bodyPr>
-            <a:normAutofit fontScale="90000"/>
-          </a:bodyPr>
-          <a:lstStyle/>
-          <a:p>
-            <a:r>
-              <a:rPr lang="en-US" dirty="0" err="1"/>
-              <a:t>Ejemplo</a:t>
-            </a:r>
-            <a:r>
-              <a:rPr lang="en-US" dirty="0"/>
-              <a:t> 2: </a:t>
-            </a:r>
+            <p:ph type="ctrTitle"/>
+          </p:nvPr>
+        </p:nvSpPr>
+        <p:spPr/>
+        <p:txBody>
+          <a:bodyPr/>
+          <a:lstStyle/>
+          <a:p>
             <a:r>
               <a:rPr lang="es-UY" dirty="0"/>
-              <a:t>¿Termina para toda entrada?</a:t>
+              <a:t>El parcial es </a:t>
+            </a:r>
+            <a:r>
+              <a:rPr lang="es-UY" b="1" dirty="0"/>
+              <a:t>CON</a:t>
+            </a:r>
+            <a:r>
+              <a:rPr lang="es-UY" dirty="0"/>
+              <a:t> material</a:t>
             </a:r>
             <a:endParaRPr lang="en-US" dirty="0"/>
           </a:p>
@@ -7278,10 +8872,10 @@
       </p:sp>
       <p:sp>
         <p:nvSpPr>
-          <p:cNvPr id="3" name="Content Placeholder 2">
+          <p:cNvPr id="3" name="Subtitle 2">
             <a:extLst>
               <a:ext uri="{FF2B5EF4-FFF2-40B4-BE49-F238E27FC236}">
-                <a16:creationId xmlns:a16="http://schemas.microsoft.com/office/drawing/2014/main" id="{D932842D-6DC9-E617-82CF-E9D9EBA2A135}"/>
+                <a16:creationId xmlns:a16="http://schemas.microsoft.com/office/drawing/2014/main" id="{B70012FA-927B-D9DE-BFE1-305E8E66AC66}"/>
               </a:ext>
             </a:extLst>
           </p:cNvPr>
@@ -7289,7 +8883,7 @@
             <a:spLocks noGrp="1"/>
           </p:cNvSpPr>
           <p:nvPr>
-            <p:ph idx="1"/>
+            <p:ph type="subTitle" idx="1"/>
           </p:nvPr>
         </p:nvSpPr>
         <p:spPr/>
@@ -7297,248 +8891,14 @@
           <a:bodyPr/>
           <a:lstStyle/>
           <a:p>
-            <a:pPr marL="0" indent="0">
-              <a:buNone/>
-            </a:pPr>
-            <a:endParaRPr lang="es-UY" dirty="0"/>
-          </a:p>
-          <a:p>
-            <a:pPr marL="0" indent="0">
-              <a:buNone/>
-            </a:pPr>
-            <a:endParaRPr lang="es-UY" dirty="0"/>
-          </a:p>
-          <a:p>
-            <a:pPr marL="0" indent="0">
-              <a:buNone/>
-            </a:pPr>
-            <a:r>
-              <a:rPr lang="es-UY" dirty="0" err="1"/>
-              <a:t>int</a:t>
-            </a:r>
-            <a:r>
-              <a:rPr lang="es-UY" dirty="0"/>
-              <a:t> f (</a:t>
-            </a:r>
-            <a:r>
-              <a:rPr lang="es-UY" dirty="0" err="1"/>
-              <a:t>int</a:t>
-            </a:r>
-            <a:r>
-              <a:rPr lang="es-UY" dirty="0"/>
-              <a:t> x, </a:t>
-            </a:r>
-            <a:r>
-              <a:rPr lang="es-UY" dirty="0" err="1"/>
-              <a:t>int</a:t>
-            </a:r>
-            <a:r>
-              <a:rPr lang="es-UY" dirty="0"/>
-              <a:t> y) </a:t>
-            </a:r>
-            <a:r>
-              <a:rPr lang="en-US" dirty="0"/>
-              <a:t>{</a:t>
-            </a:r>
-          </a:p>
-          <a:p>
-            <a:pPr marL="0" indent="0">
-              <a:buNone/>
-            </a:pPr>
-            <a:r>
-              <a:rPr lang="en-US" dirty="0"/>
-              <a:t>	return x / y</a:t>
-            </a:r>
-          </a:p>
-          <a:p>
-            <a:pPr marL="0" indent="0">
-              <a:buNone/>
-            </a:pPr>
-            <a:r>
-              <a:rPr lang="en-US" dirty="0"/>
-              <a:t>}</a:t>
-            </a:r>
+            <a:endParaRPr lang="en-US" dirty="0"/>
           </a:p>
         </p:txBody>
       </p:sp>
     </p:spTree>
     <p:extLst>
       <p:ext uri="{BB962C8B-B14F-4D97-AF65-F5344CB8AC3E}">
-        <p14:creationId xmlns:p14="http://schemas.microsoft.com/office/powerpoint/2010/main" val="2513385391"/>
-      </p:ext>
-    </p:extLst>
-  </p:cSld>
-  <p:clrMapOvr>
-    <a:masterClrMapping/>
-  </p:clrMapOvr>
-</p:sld>
-</file>
-
-<file path=ppt/slides/slide5.xml><?xml version="1.0" encoding="utf-8"?>
-<p:sld xmlns:a="http://schemas.openxmlformats.org/drawingml/2006/main" xmlns:r="http://schemas.openxmlformats.org/officeDocument/2006/relationships" xmlns:p="http://schemas.openxmlformats.org/presentationml/2006/main">
-  <p:cSld>
-    <p:spTree>
-      <p:nvGrpSpPr>
-        <p:cNvPr id="1" name="">
-          <a:extLst>
-            <a:ext uri="{FF2B5EF4-FFF2-40B4-BE49-F238E27FC236}">
-              <a16:creationId xmlns:a16="http://schemas.microsoft.com/office/drawing/2014/main" id="{A5B2A4B8-5874-20EC-7AE9-D80B62393FC0}"/>
-            </a:ext>
-          </a:extLst>
-        </p:cNvPr>
-        <p:cNvGrpSpPr/>
-        <p:nvPr/>
-      </p:nvGrpSpPr>
-      <p:grpSpPr>
-        <a:xfrm>
-          <a:off x="0" y="0"/>
-          <a:ext cx="0" cy="0"/>
-          <a:chOff x="0" y="0"/>
-          <a:chExt cx="0" cy="0"/>
-        </a:xfrm>
-      </p:grpSpPr>
-      <p:sp>
-        <p:nvSpPr>
-          <p:cNvPr id="2" name="Title 1">
-            <a:extLst>
-              <a:ext uri="{FF2B5EF4-FFF2-40B4-BE49-F238E27FC236}">
-                <a16:creationId xmlns:a16="http://schemas.microsoft.com/office/drawing/2014/main" id="{F6DEA4AB-66E8-3BDC-84A0-3FBF92C7B266}"/>
-              </a:ext>
-            </a:extLst>
-          </p:cNvPr>
-          <p:cNvSpPr>
-            <a:spLocks noGrp="1"/>
-          </p:cNvSpPr>
-          <p:nvPr>
-            <p:ph type="title"/>
-          </p:nvPr>
-        </p:nvSpPr>
-        <p:spPr>
-          <a:xfrm>
-            <a:off x="457200" y="274638"/>
-            <a:ext cx="8487508" cy="1143000"/>
-          </a:xfrm>
-        </p:spPr>
-        <p:txBody>
-          <a:bodyPr>
-            <a:normAutofit fontScale="90000"/>
-          </a:bodyPr>
-          <a:lstStyle/>
-          <a:p>
-            <a:r>
-              <a:rPr lang="en-US" dirty="0" err="1"/>
-              <a:t>Ejemplo</a:t>
-            </a:r>
-            <a:r>
-              <a:rPr lang="en-US" dirty="0"/>
-              <a:t> 3: </a:t>
-            </a:r>
-            <a:r>
-              <a:rPr lang="es-UY" dirty="0"/>
-              <a:t>¿Termina para toda entrada?</a:t>
-            </a:r>
-            <a:endParaRPr lang="en-US" dirty="0"/>
-          </a:p>
-        </p:txBody>
-      </p:sp>
-      <p:sp>
-        <p:nvSpPr>
-          <p:cNvPr id="3" name="Content Placeholder 2">
-            <a:extLst>
-              <a:ext uri="{FF2B5EF4-FFF2-40B4-BE49-F238E27FC236}">
-                <a16:creationId xmlns:a16="http://schemas.microsoft.com/office/drawing/2014/main" id="{91E4F83D-FB49-90D4-DAD1-59F7FB13305F}"/>
-              </a:ext>
-            </a:extLst>
-          </p:cNvPr>
-          <p:cNvSpPr>
-            <a:spLocks noGrp="1"/>
-          </p:cNvSpPr>
-          <p:nvPr>
-            <p:ph idx="1"/>
-          </p:nvPr>
-        </p:nvSpPr>
-        <p:spPr/>
-        <p:txBody>
-          <a:bodyPr/>
-          <a:lstStyle/>
-          <a:p>
-            <a:pPr marL="0" indent="0">
-              <a:buNone/>
-            </a:pPr>
-            <a:endParaRPr lang="es-UY" dirty="0"/>
-          </a:p>
-          <a:p>
-            <a:pPr marL="0" indent="0">
-              <a:buNone/>
-            </a:pPr>
-            <a:endParaRPr lang="es-UY" dirty="0"/>
-          </a:p>
-          <a:p>
-            <a:pPr marL="0" indent="0">
-              <a:buNone/>
-            </a:pPr>
-            <a:r>
-              <a:rPr lang="es-UY" dirty="0" err="1"/>
-              <a:t>int</a:t>
-            </a:r>
-            <a:r>
-              <a:rPr lang="es-UY" dirty="0"/>
-              <a:t> f (</a:t>
-            </a:r>
-            <a:r>
-              <a:rPr lang="es-UY" dirty="0" err="1"/>
-              <a:t>int</a:t>
-            </a:r>
-            <a:r>
-              <a:rPr lang="es-UY" dirty="0"/>
-              <a:t> x, </a:t>
-            </a:r>
-            <a:r>
-              <a:rPr lang="es-UY" dirty="0" err="1"/>
-              <a:t>int</a:t>
-            </a:r>
-            <a:r>
-              <a:rPr lang="es-UY" dirty="0"/>
-              <a:t> y) </a:t>
-            </a:r>
-            <a:r>
-              <a:rPr lang="en-US" dirty="0"/>
-              <a:t>{</a:t>
-            </a:r>
-          </a:p>
-          <a:p>
-            <a:pPr marL="0" indent="0">
-              <a:buNone/>
-            </a:pPr>
-            <a:r>
-              <a:rPr lang="en-US" dirty="0"/>
-              <a:t>	while (true){}</a:t>
-            </a:r>
-          </a:p>
-          <a:p>
-            <a:pPr marL="0" indent="0">
-              <a:buNone/>
-            </a:pPr>
-            <a:r>
-              <a:rPr lang="en-US" dirty="0"/>
-              <a:t>	return 0;</a:t>
-            </a:r>
-          </a:p>
-          <a:p>
-            <a:pPr marL="0" indent="0">
-              <a:buNone/>
-            </a:pPr>
-            <a:r>
-              <a:rPr lang="en-US" dirty="0"/>
-              <a:t>}</a:t>
-            </a:r>
-          </a:p>
-        </p:txBody>
-      </p:sp>
-    </p:spTree>
-    <p:extLst>
-      <p:ext uri="{BB962C8B-B14F-4D97-AF65-F5344CB8AC3E}">
-        <p14:creationId xmlns:p14="http://schemas.microsoft.com/office/powerpoint/2010/main" val="1289822110"/>
+        <p14:creationId xmlns:p14="http://schemas.microsoft.com/office/powerpoint/2010/main" val="737295669"/>
       </p:ext>
     </p:extLst>
   </p:cSld>
@@ -7553,13 +8913,7 @@
   <p:cSld>
     <p:spTree>
       <p:nvGrpSpPr>
-        <p:cNvPr id="1" name="">
-          <a:extLst>
-            <a:ext uri="{FF2B5EF4-FFF2-40B4-BE49-F238E27FC236}">
-              <a16:creationId xmlns:a16="http://schemas.microsoft.com/office/drawing/2014/main" id="{0F9FD9E7-D79C-7905-3F11-4A5BD8EC11F4}"/>
-            </a:ext>
-          </a:extLst>
-        </p:cNvPr>
+        <p:cNvPr id="1" name=""/>
         <p:cNvGrpSpPr/>
         <p:nvPr/>
       </p:nvGrpSpPr>
@@ -7576,7 +8930,7 @@
           <p:cNvPr id="2" name="Title 1">
             <a:extLst>
               <a:ext uri="{FF2B5EF4-FFF2-40B4-BE49-F238E27FC236}">
-                <a16:creationId xmlns:a16="http://schemas.microsoft.com/office/drawing/2014/main" id="{B9F79499-FEAB-6A65-8603-42C0CF234FA0}"/>
+                <a16:creationId xmlns:a16="http://schemas.microsoft.com/office/drawing/2014/main" id="{B5F1806F-F03C-D97D-2D52-822263CEC564}"/>
               </a:ext>
             </a:extLst>
           </p:cNvPr>
@@ -7587,29 +8941,14 @@
             <p:ph type="title"/>
           </p:nvPr>
         </p:nvSpPr>
-        <p:spPr>
-          <a:xfrm>
-            <a:off x="457200" y="274638"/>
-            <a:ext cx="8487508" cy="1143000"/>
-          </a:xfrm>
-        </p:spPr>
-        <p:txBody>
-          <a:bodyPr>
-            <a:normAutofit fontScale="90000"/>
-          </a:bodyPr>
-          <a:lstStyle/>
-          <a:p>
-            <a:r>
-              <a:rPr lang="en-US" dirty="0" err="1"/>
-              <a:t>Ejemplo</a:t>
-            </a:r>
-            <a:r>
-              <a:rPr lang="en-US" dirty="0"/>
-              <a:t> 4: </a:t>
-            </a:r>
+        <p:spPr/>
+        <p:txBody>
+          <a:bodyPr/>
+          <a:lstStyle/>
+          <a:p>
             <a:r>
               <a:rPr lang="es-UY" dirty="0"/>
-              <a:t>¿Termina para toda entrada?</a:t>
+              <a:t>Comunicación oficial</a:t>
             </a:r>
             <a:endParaRPr lang="en-US" dirty="0"/>
           </a:p>
@@ -7620,7 +8959,7 @@
           <p:cNvPr id="3" name="Content Placeholder 2">
             <a:extLst>
               <a:ext uri="{FF2B5EF4-FFF2-40B4-BE49-F238E27FC236}">
-                <a16:creationId xmlns:a16="http://schemas.microsoft.com/office/drawing/2014/main" id="{8AD248E1-A697-97BC-D57F-114A53E10BEC}"/>
+                <a16:creationId xmlns:a16="http://schemas.microsoft.com/office/drawing/2014/main" id="{66FAD869-0A83-331B-613E-991C6EC0E45F}"/>
               </a:ext>
             </a:extLst>
           </p:cNvPr>
@@ -7633,99 +8972,31 @@
         </p:nvSpPr>
         <p:spPr/>
         <p:txBody>
-          <a:bodyPr>
-            <a:normAutofit fontScale="92500" lnSpcReduction="20000"/>
-          </a:bodyPr>
-          <a:lstStyle/>
-          <a:p>
-            <a:pPr marL="0" indent="0">
-              <a:buNone/>
+          <a:bodyPr/>
+          <a:lstStyle/>
+          <a:p>
+            <a:pPr>
+              <a:buFontTx/>
+              <a:buChar char="-"/>
             </a:pPr>
+            <a:r>
+              <a:rPr lang="es-UY" dirty="0"/>
+              <a:t>Equipo de </a:t>
+            </a:r>
+            <a:r>
+              <a:rPr lang="es-UY" dirty="0" err="1"/>
+              <a:t>Teams</a:t>
+            </a:r>
             <a:endParaRPr lang="es-UY" dirty="0"/>
           </a:p>
           <a:p>
-            <a:pPr marL="0" indent="0">
-              <a:buNone/>
+            <a:pPr>
+              <a:buFontTx/>
+              <a:buChar char="-"/>
             </a:pPr>
-            <a:endParaRPr lang="es-UY" dirty="0"/>
-          </a:p>
-          <a:p>
-            <a:pPr marL="0" indent="0">
-              <a:buNone/>
-            </a:pPr>
-            <a:r>
-              <a:rPr lang="es-UY" dirty="0" err="1"/>
-              <a:t>int</a:t>
-            </a:r>
             <a:r>
               <a:rPr lang="es-UY" dirty="0"/>
-              <a:t> f (</a:t>
-            </a:r>
-            <a:r>
-              <a:rPr lang="es-UY" dirty="0" err="1"/>
-              <a:t>int</a:t>
-            </a:r>
-            <a:r>
-              <a:rPr lang="es-UY" dirty="0"/>
-              <a:t> n) </a:t>
-            </a:r>
-            <a:r>
-              <a:rPr lang="en-US" dirty="0"/>
-              <a:t>{</a:t>
-            </a:r>
-          </a:p>
-          <a:p>
-            <a:pPr marL="0" indent="0">
-              <a:buNone/>
-            </a:pPr>
-            <a:r>
-              <a:rPr lang="en-US" dirty="0"/>
-              <a:t>	if ( n == 0 ) { </a:t>
-            </a:r>
-          </a:p>
-          <a:p>
-            <a:pPr marL="0" indent="0">
-              <a:buNone/>
-            </a:pPr>
-            <a:r>
-              <a:rPr lang="en-US" dirty="0"/>
-              <a:t>		return  f(0);</a:t>
-            </a:r>
-          </a:p>
-          <a:p>
-            <a:pPr marL="0" indent="0">
-              <a:buNone/>
-            </a:pPr>
-            <a:r>
-              <a:rPr lang="en-US" dirty="0"/>
-              <a:t>	} else {</a:t>
-            </a:r>
-          </a:p>
-          <a:p>
-            <a:pPr marL="0" indent="0">
-              <a:buNone/>
-            </a:pPr>
-            <a:r>
-              <a:rPr lang="en-US" dirty="0"/>
-              <a:t>		return 0;</a:t>
-            </a:r>
-          </a:p>
-          <a:p>
-            <a:pPr marL="0" indent="0">
-              <a:buNone/>
-            </a:pPr>
-            <a:r>
-              <a:rPr lang="en-US" dirty="0"/>
-              <a:t>	}	</a:t>
-            </a:r>
-          </a:p>
-          <a:p>
-            <a:pPr marL="0" indent="0">
-              <a:buNone/>
-            </a:pPr>
-            <a:r>
-              <a:rPr lang="en-US" dirty="0"/>
-              <a:t>}</a:t>
+              <a:t>Foros de Aulas</a:t>
             </a:r>
           </a:p>
         </p:txBody>
@@ -7733,7 +9004,7 @@
     </p:spTree>
     <p:extLst>
       <p:ext uri="{BB962C8B-B14F-4D97-AF65-F5344CB8AC3E}">
-        <p14:creationId xmlns:p14="http://schemas.microsoft.com/office/powerpoint/2010/main" val="3307850436"/>
+        <p14:creationId xmlns:p14="http://schemas.microsoft.com/office/powerpoint/2010/main" val="2814244012"/>
       </p:ext>
     </p:extLst>
   </p:cSld>
@@ -7748,13 +9019,7 @@
   <p:cSld>
     <p:spTree>
       <p:nvGrpSpPr>
-        <p:cNvPr id="1" name="">
-          <a:extLst>
-            <a:ext uri="{FF2B5EF4-FFF2-40B4-BE49-F238E27FC236}">
-              <a16:creationId xmlns:a16="http://schemas.microsoft.com/office/drawing/2014/main" id="{B269735A-3709-920C-A254-2B7BC4DB6B36}"/>
-            </a:ext>
-          </a:extLst>
-        </p:cNvPr>
+        <p:cNvPr id="1" name=""/>
         <p:cNvGrpSpPr/>
         <p:nvPr/>
       </p:nvGrpSpPr>
@@ -7771,7 +9036,7 @@
           <p:cNvPr id="2" name="Title 1">
             <a:extLst>
               <a:ext uri="{FF2B5EF4-FFF2-40B4-BE49-F238E27FC236}">
-                <a16:creationId xmlns:a16="http://schemas.microsoft.com/office/drawing/2014/main" id="{781B792C-845C-890D-F181-A2AFF256F078}"/>
+                <a16:creationId xmlns:a16="http://schemas.microsoft.com/office/drawing/2014/main" id="{E7C281E5-B103-5449-A27F-219D2ED73114}"/>
               </a:ext>
             </a:extLst>
           </p:cNvPr>
@@ -7779,32 +9044,17 @@
             <a:spLocks noGrp="1"/>
           </p:cNvSpPr>
           <p:nvPr>
-            <p:ph type="title"/>
-          </p:nvPr>
-        </p:nvSpPr>
-        <p:spPr>
-          <a:xfrm>
-            <a:off x="457200" y="274638"/>
-            <a:ext cx="8487508" cy="1143000"/>
-          </a:xfrm>
-        </p:spPr>
-        <p:txBody>
-          <a:bodyPr>
-            <a:normAutofit fontScale="90000"/>
-          </a:bodyPr>
-          <a:lstStyle/>
-          <a:p>
-            <a:r>
-              <a:rPr lang="en-US" dirty="0" err="1"/>
-              <a:t>Ejemplo</a:t>
-            </a:r>
-            <a:r>
-              <a:rPr lang="en-US" dirty="0"/>
-              <a:t> 5: </a:t>
-            </a:r>
+            <p:ph type="ctrTitle"/>
+          </p:nvPr>
+        </p:nvSpPr>
+        <p:spPr/>
+        <p:txBody>
+          <a:bodyPr/>
+          <a:lstStyle/>
+          <a:p>
             <a:r>
               <a:rPr lang="es-UY" dirty="0"/>
-              <a:t>¿Termina para toda entrada?</a:t>
+              <a:t>Tarea introductoria</a:t>
             </a:r>
             <a:endParaRPr lang="en-US" dirty="0"/>
           </a:p>
@@ -7812,10 +9062,10 @@
       </p:sp>
       <p:sp>
         <p:nvSpPr>
-          <p:cNvPr id="3" name="Content Placeholder 2">
+          <p:cNvPr id="3" name="Subtitle 2">
             <a:extLst>
               <a:ext uri="{FF2B5EF4-FFF2-40B4-BE49-F238E27FC236}">
-                <a16:creationId xmlns:a16="http://schemas.microsoft.com/office/drawing/2014/main" id="{0D8A5051-3C51-CDBA-1D1A-108E54A318A9}"/>
+                <a16:creationId xmlns:a16="http://schemas.microsoft.com/office/drawing/2014/main" id="{B4AE9902-D67D-1B3D-6619-C3919984CCC2}"/>
               </a:ext>
             </a:extLst>
           </p:cNvPr>
@@ -7823,109 +9073,22 @@
             <a:spLocks noGrp="1"/>
           </p:cNvSpPr>
           <p:nvPr>
-            <p:ph idx="1"/>
+            <p:ph type="subTitle" idx="1"/>
           </p:nvPr>
         </p:nvSpPr>
         <p:spPr/>
         <p:txBody>
-          <a:bodyPr>
-            <a:normAutofit lnSpcReduction="10000"/>
-          </a:bodyPr>
-          <a:lstStyle/>
-          <a:p>
-            <a:pPr marL="0" indent="0">
-              <a:buNone/>
-            </a:pPr>
-            <a:r>
-              <a:rPr lang="es-UY" dirty="0" err="1"/>
-              <a:t>int</a:t>
-            </a:r>
-            <a:r>
-              <a:rPr lang="es-UY" dirty="0"/>
-              <a:t> f (</a:t>
-            </a:r>
-            <a:r>
-              <a:rPr lang="es-UY" dirty="0" err="1"/>
-              <a:t>int</a:t>
-            </a:r>
-            <a:r>
-              <a:rPr lang="es-UY" dirty="0"/>
-              <a:t> n) </a:t>
-            </a:r>
-            <a:r>
-              <a:rPr lang="en-US" dirty="0"/>
-              <a:t>{</a:t>
-            </a:r>
-          </a:p>
-          <a:p>
-            <a:pPr marL="0" indent="0">
-              <a:buNone/>
-            </a:pPr>
-            <a:r>
-              <a:rPr lang="en-US" dirty="0"/>
-              <a:t>	if ( n == 1 ) { </a:t>
-            </a:r>
-          </a:p>
-          <a:p>
-            <a:pPr marL="0" indent="0">
-              <a:buNone/>
-            </a:pPr>
-            <a:r>
-              <a:rPr lang="en-US" dirty="0"/>
-              <a:t>		return  1;</a:t>
-            </a:r>
-          </a:p>
-          <a:p>
-            <a:pPr marL="0" indent="0">
-              <a:buNone/>
-            </a:pPr>
-            <a:r>
-              <a:rPr lang="en-US" dirty="0"/>
-              <a:t>	} else {</a:t>
-            </a:r>
-          </a:p>
-          <a:p>
-            <a:pPr marL="0" indent="0">
-              <a:buNone/>
-            </a:pPr>
-            <a:r>
-              <a:rPr lang="en-US" dirty="0"/>
-              <a:t>		if (n % 2  == 0 ) { return f(n/2) }</a:t>
-            </a:r>
-          </a:p>
-          <a:p>
-            <a:pPr marL="0" indent="0">
-              <a:buNone/>
-            </a:pPr>
-            <a:r>
-              <a:rPr lang="en-US" dirty="0"/>
-              <a:t>		else { return f(3*n+1) }</a:t>
-            </a:r>
-          </a:p>
-          <a:p>
-            <a:pPr marL="0" indent="0">
-              <a:buNone/>
-            </a:pPr>
-            <a:r>
-              <a:rPr lang="en-US" dirty="0"/>
-              <a:t>	}	</a:t>
-            </a:r>
-          </a:p>
-          <a:p>
-            <a:pPr marL="0" indent="0">
-              <a:buNone/>
-            </a:pPr>
-            <a:r>
-              <a:rPr lang="en-US" dirty="0"/>
-              <a:t>}</a:t>
-            </a:r>
+          <a:bodyPr/>
+          <a:lstStyle/>
+          <a:p>
+            <a:endParaRPr lang="en-US"/>
           </a:p>
         </p:txBody>
       </p:sp>
     </p:spTree>
     <p:extLst>
       <p:ext uri="{BB962C8B-B14F-4D97-AF65-F5344CB8AC3E}">
-        <p14:creationId xmlns:p14="http://schemas.microsoft.com/office/powerpoint/2010/main" val="360950416"/>
+        <p14:creationId xmlns:p14="http://schemas.microsoft.com/office/powerpoint/2010/main" val="1779295104"/>
       </p:ext>
     </p:extLst>
   </p:cSld>
@@ -7957,7 +9120,7 @@
           <p:cNvPr id="2" name="Title 1">
             <a:extLst>
               <a:ext uri="{FF2B5EF4-FFF2-40B4-BE49-F238E27FC236}">
-                <a16:creationId xmlns:a16="http://schemas.microsoft.com/office/drawing/2014/main" id="{79420FB2-89A6-E3E8-7277-113C3F3D81C5}"/>
+                <a16:creationId xmlns:a16="http://schemas.microsoft.com/office/drawing/2014/main" id="{53D20D83-3DF6-446C-45F4-032B3414121C}"/>
               </a:ext>
             </a:extLst>
           </p:cNvPr>
@@ -7974,13 +9137,10 @@
           <a:lstStyle/>
           <a:p>
             <a:r>
-              <a:rPr lang="en-US" dirty="0" err="1"/>
-              <a:t>Conjetura</a:t>
-            </a:r>
-            <a:r>
-              <a:rPr lang="en-US" dirty="0"/>
-              <a:t> de Collatz</a:t>
-            </a:r>
+              <a:rPr lang="es-UY" dirty="0"/>
+              <a:t>Pregunta:</a:t>
+            </a:r>
+            <a:endParaRPr lang="en-US" dirty="0"/>
           </a:p>
         </p:txBody>
       </p:sp>
@@ -7989,7 +9149,7 @@
           <p:cNvPr id="3" name="Content Placeholder 2">
             <a:extLst>
               <a:ext uri="{FF2B5EF4-FFF2-40B4-BE49-F238E27FC236}">
-                <a16:creationId xmlns:a16="http://schemas.microsoft.com/office/drawing/2014/main" id="{FB808639-51D8-A4E4-02BB-C9F6070B04C8}"/>
+                <a16:creationId xmlns:a16="http://schemas.microsoft.com/office/drawing/2014/main" id="{4E3AD963-9605-3C64-4BD5-4F51FA806E1B}"/>
               </a:ext>
             </a:extLst>
           </p:cNvPr>
@@ -8005,61 +9165,37 @@
           <a:bodyPr/>
           <a:lstStyle/>
           <a:p>
-            <a:endParaRPr lang="en-US"/>
-          </a:p>
-        </p:txBody>
-      </p:sp>
-      <p:pic>
-        <p:nvPicPr>
-          <p:cNvPr id="1026" name="Picture 2" descr="undefined">
-            <a:extLst>
-              <a:ext uri="{FF2B5EF4-FFF2-40B4-BE49-F238E27FC236}">
-                <a16:creationId xmlns:a16="http://schemas.microsoft.com/office/drawing/2014/main" id="{A124755E-246F-DC41-21A0-A5802916DC3D}"/>
-              </a:ext>
-            </a:extLst>
-          </p:cNvPr>
-          <p:cNvPicPr>
-            <a:picLocks noChangeAspect="1" noChangeArrowheads="1"/>
-          </p:cNvPicPr>
-          <p:nvPr/>
-        </p:nvPicPr>
-        <p:blipFill>
-          <a:blip r:embed="rId2">
-            <a:extLst>
-              <a:ext uri="{28A0092B-C50C-407E-A947-70E740481C1C}">
-                <a14:useLocalDpi xmlns:a14="http://schemas.microsoft.com/office/drawing/2010/main" val="0"/>
-              </a:ext>
-            </a:extLst>
-          </a:blip>
-          <a:srcRect/>
-          <a:stretch>
-            <a:fillRect/>
-          </a:stretch>
-        </p:blipFill>
-        <p:spPr bwMode="auto">
-          <a:xfrm>
-            <a:off x="457200" y="1371600"/>
-            <a:ext cx="8686800" cy="4343400"/>
-          </a:xfrm>
-          <a:prstGeom prst="rect">
-            <a:avLst/>
-          </a:prstGeom>
-          <a:noFill/>
-          <a:extLst>
-            <a:ext uri="{909E8E84-426E-40DD-AFC4-6F175D3DCCD1}">
-              <a14:hiddenFill xmlns:a14="http://schemas.microsoft.com/office/drawing/2010/main">
-                <a:solidFill>
-                  <a:srgbClr val="FFFFFF"/>
-                </a:solidFill>
-              </a14:hiddenFill>
-            </a:ext>
-          </a:extLst>
-        </p:spPr>
-      </p:pic>
+            <a:pPr marL="0" indent="0">
+              <a:buNone/>
+            </a:pPr>
+            <a:r>
+              <a:rPr lang="es-ES" dirty="0"/>
+              <a:t>El jefe de desarrollo te encarga como ingeniero la tarea de realizar un programa que lea código de otros programas y determine en cada caso si el programa leído entra o no en </a:t>
+            </a:r>
+            <a:r>
+              <a:rPr lang="es-ES" dirty="0" err="1"/>
+              <a:t>loop</a:t>
+            </a:r>
+            <a:r>
+              <a:rPr lang="es-ES" dirty="0"/>
+              <a:t> infinito para alguna entrada. ¿Cuál </a:t>
+            </a:r>
+            <a:r>
+              <a:rPr lang="es-ES" dirty="0" err="1"/>
+              <a:t>sera</a:t>
+            </a:r>
+            <a:r>
+              <a:rPr lang="es-ES" dirty="0"/>
+              <a:t> tu respuesta?</a:t>
+            </a:r>
+            <a:endParaRPr lang="en-US" dirty="0"/>
+          </a:p>
+        </p:txBody>
+      </p:sp>
     </p:spTree>
     <p:extLst>
       <p:ext uri="{BB962C8B-B14F-4D97-AF65-F5344CB8AC3E}">
-        <p14:creationId xmlns:p14="http://schemas.microsoft.com/office/powerpoint/2010/main" val="358580910"/>
+        <p14:creationId xmlns:p14="http://schemas.microsoft.com/office/powerpoint/2010/main" val="3147908118"/>
       </p:ext>
     </p:extLst>
   </p:cSld>
@@ -8088,242 +9224,71 @@
       </p:grpSpPr>
       <p:sp>
         <p:nvSpPr>
-          <p:cNvPr id="2" name="Title 1">
-            <a:extLst>
-              <a:ext uri="{FF2B5EF4-FFF2-40B4-BE49-F238E27FC236}">
-                <a16:creationId xmlns:a16="http://schemas.microsoft.com/office/drawing/2014/main" id="{467723AB-97DC-795F-1AEB-162771DC8B02}"/>
-              </a:ext>
-            </a:extLst>
-          </p:cNvPr>
-          <p:cNvSpPr>
-            <a:spLocks noGrp="1"/>
-          </p:cNvSpPr>
-          <p:nvPr>
-            <p:ph type="title"/>
-          </p:nvPr>
-        </p:nvSpPr>
-        <p:spPr/>
+          <p:cNvPr id="2" name="Title 1"/>
+          <p:cNvSpPr>
+            <a:spLocks noGrp="1"/>
+          </p:cNvSpPr>
+          <p:nvPr>
+            <p:ph type="ctrTitle"/>
+          </p:nvPr>
+        </p:nvSpPr>
+        <p:spPr>
+          <a:xfrm>
+            <a:off x="685800" y="1753054"/>
+            <a:ext cx="7772400" cy="1470025"/>
+          </a:xfrm>
+        </p:spPr>
+        <p:txBody>
+          <a:bodyPr/>
+          <a:lstStyle/>
+          <a:p>
+            <a:r>
+              <a:rPr lang="en-US" dirty="0"/>
+              <a:t>Halting Problem (HP)</a:t>
+            </a:r>
+            <a:endParaRPr dirty="0"/>
+          </a:p>
+        </p:txBody>
+      </p:sp>
+      <p:sp>
+        <p:nvSpPr>
+          <p:cNvPr id="3" name="Subtitle 2"/>
+          <p:cNvSpPr>
+            <a:spLocks noGrp="1"/>
+          </p:cNvSpPr>
+          <p:nvPr>
+            <p:ph type="subTitle" idx="1"/>
+          </p:nvPr>
+        </p:nvSpPr>
+        <p:spPr>
+          <a:xfrm>
+            <a:off x="1371600" y="3429001"/>
+            <a:ext cx="6400800" cy="2623456"/>
+          </a:xfrm>
+        </p:spPr>
         <p:txBody>
           <a:bodyPr>
-            <a:normAutofit fontScale="90000"/>
-          </a:bodyPr>
-          <a:lstStyle/>
-          <a:p>
-            <a:r>
-              <a:rPr lang="es-UY" dirty="0"/>
-              <a:t>¿Terminan? ¿Qué tienen en común?</a:t>
-            </a:r>
-            <a:endParaRPr lang="en-US" dirty="0"/>
-          </a:p>
-        </p:txBody>
-      </p:sp>
-      <p:sp>
-        <p:nvSpPr>
-          <p:cNvPr id="3" name="Content Placeholder 2">
-            <a:extLst>
-              <a:ext uri="{FF2B5EF4-FFF2-40B4-BE49-F238E27FC236}">
-                <a16:creationId xmlns:a16="http://schemas.microsoft.com/office/drawing/2014/main" id="{EBCE5095-D77F-7C2C-8B92-3943BB42CF8B}"/>
-              </a:ext>
-            </a:extLst>
-          </p:cNvPr>
-          <p:cNvSpPr>
-            <a:spLocks noGrp="1"/>
-          </p:cNvSpPr>
-          <p:nvPr>
-            <p:ph idx="1"/>
-          </p:nvPr>
-        </p:nvSpPr>
-        <p:spPr/>
-        <p:txBody>
-          <a:bodyPr numCol="2">
             <a:normAutofit/>
           </a:bodyPr>
           <a:lstStyle/>
           <a:p>
-            <a:pPr marL="0" indent="0">
-              <a:buNone/>
-            </a:pPr>
-            <a:r>
-              <a:rPr lang="en-US" sz="2400" dirty="0"/>
-              <a:t>int </a:t>
-            </a:r>
-            <a:r>
-              <a:rPr lang="en-US" sz="2400" b="1" dirty="0" err="1"/>
-              <a:t>suma</a:t>
-            </a:r>
-            <a:r>
-              <a:rPr lang="en-US" sz="2400" dirty="0"/>
-              <a:t>(int a, int b) {</a:t>
-            </a:r>
-          </a:p>
-          <a:p>
-            <a:pPr marL="0" indent="0">
-              <a:buNone/>
-            </a:pPr>
-            <a:r>
-              <a:rPr lang="en-US" sz="2400" dirty="0"/>
-              <a:t>    if (b == 0)</a:t>
-            </a:r>
-          </a:p>
-          <a:p>
-            <a:pPr marL="0" indent="0">
-              <a:buNone/>
-            </a:pPr>
-            <a:r>
-              <a:rPr lang="en-US" sz="2400" dirty="0"/>
-              <a:t>        return a;</a:t>
-            </a:r>
-          </a:p>
-          <a:p>
-            <a:pPr marL="0" indent="0">
-              <a:buNone/>
-            </a:pPr>
-            <a:r>
-              <a:rPr lang="en-US" sz="2400" dirty="0"/>
-              <a:t>    else</a:t>
-            </a:r>
-          </a:p>
-          <a:p>
-            <a:pPr marL="0" indent="0">
-              <a:buNone/>
-            </a:pPr>
-            <a:r>
-              <a:rPr lang="en-US" sz="2400" dirty="0"/>
-              <a:t>        return </a:t>
-            </a:r>
-            <a:r>
-              <a:rPr lang="en-US" sz="2400" dirty="0" err="1"/>
-              <a:t>suma</a:t>
-            </a:r>
-            <a:r>
-              <a:rPr lang="en-US" sz="2400" dirty="0"/>
-              <a:t>(a, b - 1) + 1;}</a:t>
-            </a:r>
-          </a:p>
-          <a:p>
-            <a:pPr marL="0" indent="0">
-              <a:buNone/>
-            </a:pPr>
-            <a:endParaRPr lang="en-US" sz="2400" dirty="0"/>
-          </a:p>
-          <a:p>
-            <a:pPr marL="0" indent="0">
-              <a:buNone/>
-            </a:pPr>
-            <a:r>
-              <a:rPr lang="en-US" sz="2400" dirty="0"/>
-              <a:t>int </a:t>
-            </a:r>
-            <a:r>
-              <a:rPr lang="en-US" sz="2400" b="1" dirty="0" err="1"/>
-              <a:t>minimo</a:t>
-            </a:r>
-            <a:r>
-              <a:rPr lang="en-US" sz="2400" dirty="0"/>
-              <a:t>(int a, int b) {</a:t>
-            </a:r>
-          </a:p>
-          <a:p>
-            <a:pPr marL="0" indent="0">
-              <a:buNone/>
-            </a:pPr>
-            <a:r>
-              <a:rPr lang="en-US" sz="2400" dirty="0"/>
-              <a:t>    if (a == 0 || b == 0) return 0;</a:t>
-            </a:r>
-          </a:p>
-          <a:p>
-            <a:pPr marL="0" indent="0">
-              <a:buNone/>
-            </a:pPr>
-            <a:r>
-              <a:rPr lang="en-US" sz="2400" dirty="0"/>
-              <a:t>    else return 1 + </a:t>
-            </a:r>
-            <a:r>
-              <a:rPr lang="en-US" sz="2400" dirty="0" err="1"/>
-              <a:t>minimo</a:t>
-            </a:r>
-            <a:r>
-              <a:rPr lang="en-US" sz="2400" dirty="0"/>
-              <a:t>(a - 1, b - 1);}</a:t>
-            </a:r>
-          </a:p>
-          <a:p>
-            <a:pPr marL="0" indent="0">
-              <a:buNone/>
-            </a:pPr>
-            <a:r>
-              <a:rPr lang="en-US" sz="2400" dirty="0"/>
-              <a:t>int </a:t>
-            </a:r>
-            <a:r>
-              <a:rPr lang="en-US" sz="2400" b="1" dirty="0"/>
-              <a:t>factorial</a:t>
-            </a:r>
-            <a:r>
-              <a:rPr lang="en-US" sz="2400" dirty="0"/>
-              <a:t>(int n) {</a:t>
-            </a:r>
-          </a:p>
-          <a:p>
-            <a:pPr marL="0" indent="0">
-              <a:buNone/>
-            </a:pPr>
-            <a:r>
-              <a:rPr lang="en-US" sz="2400" dirty="0"/>
-              <a:t>    if (n == 0)</a:t>
-            </a:r>
-          </a:p>
-          <a:p>
-            <a:pPr marL="0" indent="0">
-              <a:buNone/>
-            </a:pPr>
-            <a:r>
-              <a:rPr lang="en-US" sz="2400" dirty="0"/>
-              <a:t>        return 1;</a:t>
-            </a:r>
-          </a:p>
-          <a:p>
-            <a:pPr marL="0" indent="0">
-              <a:buNone/>
-            </a:pPr>
-            <a:r>
-              <a:rPr lang="en-US" sz="2400" dirty="0"/>
-              <a:t>    else</a:t>
-            </a:r>
-          </a:p>
-          <a:p>
-            <a:pPr marL="0" indent="0">
-              <a:buNone/>
-            </a:pPr>
-            <a:r>
-              <a:rPr lang="en-US" sz="2400" dirty="0"/>
-              <a:t>        return </a:t>
-            </a:r>
-            <a:r>
-              <a:rPr lang="en-US" sz="2400" dirty="0" err="1"/>
-              <a:t>multiplicacion</a:t>
-            </a:r>
-            <a:r>
-              <a:rPr lang="en-US" sz="2400" dirty="0"/>
-              <a:t>(n, factorial(n - 1));}</a:t>
-            </a:r>
-          </a:p>
-          <a:p>
-            <a:pPr marL="0" indent="0">
-              <a:buNone/>
-            </a:pPr>
-            <a:endParaRPr lang="en-US" sz="2400" dirty="0"/>
+            <a:r>
+              <a:rPr lang="es-ES" dirty="0"/>
+              <a:t>Comparación de métodos exactos, heurísticos y aproximados</a:t>
+            </a:r>
+          </a:p>
+          <a:p>
+            <a:endParaRPr lang="es-ES" dirty="0"/>
+          </a:p>
+          <a:p>
+            <a:r>
+              <a:rPr lang="es-ES" dirty="0"/>
+              <a:t>Diego Acuña – TC – Marzo 2026</a:t>
+            </a:r>
           </a:p>
         </p:txBody>
       </p:sp>
     </p:spTree>
-    <p:extLst>
-      <p:ext uri="{BB962C8B-B14F-4D97-AF65-F5344CB8AC3E}">
-        <p14:creationId xmlns:p14="http://schemas.microsoft.com/office/powerpoint/2010/main" val="2374071135"/>
-      </p:ext>
-    </p:extLst>
   </p:cSld>
   <p:clrMapOvr>
     <a:masterClrMapping/>

</xml_diff>